<commit_message>
Added other path diagrams to powerpoint
</commit_message>
<xml_diff>
--- a/pathDiagrams.pptx
+++ b/pathDiagrams.pptx
@@ -15,6 +15,16 @@
     <p:sldId id="264" r:id="rId9"/>
     <p:sldId id="265" r:id="rId10"/>
     <p:sldId id="266" r:id="rId11"/>
+    <p:sldId id="267" r:id="rId12"/>
+    <p:sldId id="268" r:id="rId13"/>
+    <p:sldId id="269" r:id="rId14"/>
+    <p:sldId id="270" r:id="rId15"/>
+    <p:sldId id="271" r:id="rId16"/>
+    <p:sldId id="272" r:id="rId17"/>
+    <p:sldId id="273" r:id="rId18"/>
+    <p:sldId id="274" r:id="rId19"/>
+    <p:sldId id="275" r:id="rId20"/>
+    <p:sldId id="276" r:id="rId21"/>
   </p:sldIdLst>
   <p:sldSz cx="12192000" cy="6858000"/>
   <p:notesSz cx="6858000" cy="9144000"/>
@@ -113,6 +123,11 @@
       </a:defRPr>
     </a:lvl9pPr>
   </p:defaultTextStyle>
+  <p:extLst>
+    <p:ext uri="{EFAFB233-063F-42B5-8137-9DF3F51BA10A}">
+      <p15:sldGuideLst xmlns:p15="http://schemas.microsoft.com/office/powerpoint/2012/main"/>
+    </p:ext>
+  </p:extLst>
 </p:presentation>
 </file>
 
@@ -263,7 +278,7 @@
           <a:p>
             <a:fld id="{45AB89E2-EB15-4EB7-81DE-388F1B5969A9}" type="datetimeFigureOut">
               <a:rPr lang="en-US" smtClean="0"/>
-              <a:t>9/30/2020</a:t>
+              <a:t>10/8/2020</a:t>
             </a:fld>
             <a:endParaRPr lang="en-US"/>
           </a:p>
@@ -461,7 +476,7 @@
           <a:p>
             <a:fld id="{45AB89E2-EB15-4EB7-81DE-388F1B5969A9}" type="datetimeFigureOut">
               <a:rPr lang="en-US" smtClean="0"/>
-              <a:t>9/30/2020</a:t>
+              <a:t>10/8/2020</a:t>
             </a:fld>
             <a:endParaRPr lang="en-US"/>
           </a:p>
@@ -669,7 +684,7 @@
           <a:p>
             <a:fld id="{45AB89E2-EB15-4EB7-81DE-388F1B5969A9}" type="datetimeFigureOut">
               <a:rPr lang="en-US" smtClean="0"/>
-              <a:t>9/30/2020</a:t>
+              <a:t>10/8/2020</a:t>
             </a:fld>
             <a:endParaRPr lang="en-US"/>
           </a:p>
@@ -867,7 +882,7 @@
           <a:p>
             <a:fld id="{45AB89E2-EB15-4EB7-81DE-388F1B5969A9}" type="datetimeFigureOut">
               <a:rPr lang="en-US" smtClean="0"/>
-              <a:t>9/30/2020</a:t>
+              <a:t>10/8/2020</a:t>
             </a:fld>
             <a:endParaRPr lang="en-US"/>
           </a:p>
@@ -1142,7 +1157,7 @@
           <a:p>
             <a:fld id="{45AB89E2-EB15-4EB7-81DE-388F1B5969A9}" type="datetimeFigureOut">
               <a:rPr lang="en-US" smtClean="0"/>
-              <a:t>9/30/2020</a:t>
+              <a:t>10/8/2020</a:t>
             </a:fld>
             <a:endParaRPr lang="en-US"/>
           </a:p>
@@ -1407,7 +1422,7 @@
           <a:p>
             <a:fld id="{45AB89E2-EB15-4EB7-81DE-388F1B5969A9}" type="datetimeFigureOut">
               <a:rPr lang="en-US" smtClean="0"/>
-              <a:t>9/30/2020</a:t>
+              <a:t>10/8/2020</a:t>
             </a:fld>
             <a:endParaRPr lang="en-US"/>
           </a:p>
@@ -1819,7 +1834,7 @@
           <a:p>
             <a:fld id="{45AB89E2-EB15-4EB7-81DE-388F1B5969A9}" type="datetimeFigureOut">
               <a:rPr lang="en-US" smtClean="0"/>
-              <a:t>9/30/2020</a:t>
+              <a:t>10/8/2020</a:t>
             </a:fld>
             <a:endParaRPr lang="en-US"/>
           </a:p>
@@ -1925,13 +1940,22 @@
             <p:ph type="title"/>
           </p:nvPr>
         </p:nvSpPr>
-        <p:spPr/>
+        <p:spPr>
+          <a:xfrm>
+            <a:off x="293255" y="4909416"/>
+            <a:ext cx="10515600" cy="1325563"/>
+          </a:xfrm>
+        </p:spPr>
         <p:txBody>
           <a:bodyPr/>
-          <a:lstStyle/>
-          <a:p>
-            <a:r>
-              <a:rPr lang="en-US"/>
+          <a:lstStyle>
+            <a:lvl1pPr>
+              <a:defRPr i="1"/>
+            </a:lvl1pPr>
+          </a:lstStyle>
+          <a:p>
+            <a:r>
+              <a:rPr lang="en-US" dirty="0"/>
               <a:t>Click to edit Master title style</a:t>
             </a:r>
           </a:p>
@@ -1960,7 +1984,7 @@
           <a:p>
             <a:fld id="{45AB89E2-EB15-4EB7-81DE-388F1B5969A9}" type="datetimeFigureOut">
               <a:rPr lang="en-US" smtClean="0"/>
-              <a:t>9/30/2020</a:t>
+              <a:t>10/8/2020</a:t>
             </a:fld>
             <a:endParaRPr lang="en-US"/>
           </a:p>
@@ -2073,7 +2097,7 @@
           <a:p>
             <a:fld id="{45AB89E2-EB15-4EB7-81DE-388F1B5969A9}" type="datetimeFigureOut">
               <a:rPr lang="en-US" smtClean="0"/>
-              <a:t>9/30/2020</a:t>
+              <a:t>10/8/2020</a:t>
             </a:fld>
             <a:endParaRPr lang="en-US"/>
           </a:p>
@@ -2384,7 +2408,7 @@
           <a:p>
             <a:fld id="{45AB89E2-EB15-4EB7-81DE-388F1B5969A9}" type="datetimeFigureOut">
               <a:rPr lang="en-US" smtClean="0"/>
-              <a:t>9/30/2020</a:t>
+              <a:t>10/8/2020</a:t>
             </a:fld>
             <a:endParaRPr lang="en-US"/>
           </a:p>
@@ -2672,7 +2696,7 @@
           <a:p>
             <a:fld id="{45AB89E2-EB15-4EB7-81DE-388F1B5969A9}" type="datetimeFigureOut">
               <a:rPr lang="en-US" smtClean="0"/>
-              <a:t>9/30/2020</a:t>
+              <a:t>10/8/2020</a:t>
             </a:fld>
             <a:endParaRPr lang="en-US"/>
           </a:p>
@@ -2913,7 +2937,7 @@
           <a:p>
             <a:fld id="{45AB89E2-EB15-4EB7-81DE-388F1B5969A9}" type="datetimeFigureOut">
               <a:rPr lang="en-US" smtClean="0"/>
-              <a:t>9/30/2020</a:t>
+              <a:t>10/8/2020</a:t>
             </a:fld>
             <a:endParaRPr lang="en-US"/>
           </a:p>
@@ -3657,6 +3681,885 @@
 </p:sld>
 </file>
 
+<file path=ppt/slides/slide11.xml><?xml version="1.0" encoding="utf-8"?>
+<p:sld xmlns:a="http://schemas.openxmlformats.org/drawingml/2006/main" xmlns:r="http://schemas.openxmlformats.org/officeDocument/2006/relationships" xmlns:p="http://schemas.openxmlformats.org/presentationml/2006/main">
+  <p:cSld>
+    <p:spTree>
+      <p:nvGrpSpPr>
+        <p:cNvPr id="1" name=""/>
+        <p:cNvGrpSpPr/>
+        <p:nvPr/>
+      </p:nvGrpSpPr>
+      <p:grpSpPr>
+        <a:xfrm>
+          <a:off x="0" y="0"/>
+          <a:ext cx="0" cy="0"/>
+          <a:chOff x="0" y="0"/>
+          <a:chExt cx="0" cy="0"/>
+        </a:xfrm>
+      </p:grpSpPr>
+      <p:sp>
+        <p:nvSpPr>
+          <p:cNvPr id="2" name="Title 1">
+            <a:extLst>
+              <a:ext uri="{FF2B5EF4-FFF2-40B4-BE49-F238E27FC236}">
+                <a16:creationId xmlns:a16="http://schemas.microsoft.com/office/drawing/2014/main" id="{5E1E5FFF-FBFC-488C-8FA8-D67177C9DDE8}"/>
+              </a:ext>
+            </a:extLst>
+          </p:cNvPr>
+          <p:cNvSpPr>
+            <a:spLocks noGrp="1"/>
+          </p:cNvSpPr>
+          <p:nvPr>
+            <p:ph type="title"/>
+          </p:nvPr>
+        </p:nvSpPr>
+        <p:spPr>
+          <a:xfrm>
+            <a:off x="388374" y="5314514"/>
+            <a:ext cx="10515600" cy="1325563"/>
+          </a:xfrm>
+        </p:spPr>
+        <p:txBody>
+          <a:bodyPr/>
+          <a:lstStyle/>
+          <a:p>
+            <a:r>
+              <a:rPr lang="en-US" i="1" dirty="0"/>
+              <a:t>Anemone canadensis</a:t>
+            </a:r>
+          </a:p>
+        </p:txBody>
+      </p:sp>
+      <p:pic>
+        <p:nvPicPr>
+          <p:cNvPr id="6" name="Picture 5" descr="A picture containing diagram&#10;&#10;Description automatically generated">
+            <a:extLst>
+              <a:ext uri="{FF2B5EF4-FFF2-40B4-BE49-F238E27FC236}">
+                <a16:creationId xmlns:a16="http://schemas.microsoft.com/office/drawing/2014/main" id="{2A66B919-3A62-4DF2-B154-2396BF85D8AD}"/>
+              </a:ext>
+            </a:extLst>
+          </p:cNvPr>
+          <p:cNvPicPr>
+            <a:picLocks noChangeAspect="1"/>
+          </p:cNvPicPr>
+          <p:nvPr/>
+        </p:nvPicPr>
+        <p:blipFill rotWithShape="1">
+          <a:blip r:embed="rId2">
+            <a:extLst>
+              <a:ext uri="{28A0092B-C50C-407E-A947-70E740481C1C}">
+                <a14:useLocalDpi xmlns:a14="http://schemas.microsoft.com/office/drawing/2010/main" val="0"/>
+              </a:ext>
+            </a:extLst>
+          </a:blip>
+          <a:srcRect l="29872" r="28454"/>
+          <a:stretch/>
+        </p:blipFill>
+        <p:spPr>
+          <a:xfrm>
+            <a:off x="5879690" y="0"/>
+            <a:ext cx="4927570" cy="6858000"/>
+          </a:xfrm>
+          <a:prstGeom prst="rect">
+            <a:avLst/>
+          </a:prstGeom>
+        </p:spPr>
+      </p:pic>
+    </p:spTree>
+    <p:extLst>
+      <p:ext uri="{BB962C8B-B14F-4D97-AF65-F5344CB8AC3E}">
+        <p14:creationId xmlns:p14="http://schemas.microsoft.com/office/powerpoint/2010/main" val="2613404909"/>
+      </p:ext>
+    </p:extLst>
+  </p:cSld>
+  <p:clrMapOvr>
+    <a:masterClrMapping/>
+  </p:clrMapOvr>
+</p:sld>
+</file>
+
+<file path=ppt/slides/slide12.xml><?xml version="1.0" encoding="utf-8"?>
+<p:sld xmlns:a="http://schemas.openxmlformats.org/drawingml/2006/main" xmlns:r="http://schemas.openxmlformats.org/officeDocument/2006/relationships" xmlns:p="http://schemas.openxmlformats.org/presentationml/2006/main">
+  <p:cSld>
+    <p:spTree>
+      <p:nvGrpSpPr>
+        <p:cNvPr id="1" name=""/>
+        <p:cNvGrpSpPr/>
+        <p:nvPr/>
+      </p:nvGrpSpPr>
+      <p:grpSpPr>
+        <a:xfrm>
+          <a:off x="0" y="0"/>
+          <a:ext cx="0" cy="0"/>
+          <a:chOff x="0" y="0"/>
+          <a:chExt cx="0" cy="0"/>
+        </a:xfrm>
+      </p:grpSpPr>
+      <p:sp>
+        <p:nvSpPr>
+          <p:cNvPr id="2" name="Title 1">
+            <a:extLst>
+              <a:ext uri="{FF2B5EF4-FFF2-40B4-BE49-F238E27FC236}">
+                <a16:creationId xmlns:a16="http://schemas.microsoft.com/office/drawing/2014/main" id="{919BB1CE-91B7-4599-812D-5A18BE791221}"/>
+              </a:ext>
+            </a:extLst>
+          </p:cNvPr>
+          <p:cNvSpPr>
+            <a:spLocks noGrp="1"/>
+          </p:cNvSpPr>
+          <p:nvPr>
+            <p:ph type="title"/>
+          </p:nvPr>
+        </p:nvSpPr>
+        <p:spPr>
+          <a:xfrm>
+            <a:off x="471949" y="5532437"/>
+            <a:ext cx="10515600" cy="1325563"/>
+          </a:xfrm>
+        </p:spPr>
+        <p:txBody>
+          <a:bodyPr/>
+          <a:lstStyle/>
+          <a:p>
+            <a:r>
+              <a:rPr lang="en-US" i="1" dirty="0"/>
+              <a:t>Anemone patens</a:t>
+            </a:r>
+          </a:p>
+        </p:txBody>
+      </p:sp>
+      <p:pic>
+        <p:nvPicPr>
+          <p:cNvPr id="4" name="Picture 3" descr="Chart&#10;&#10;Description automatically generated">
+            <a:extLst>
+              <a:ext uri="{FF2B5EF4-FFF2-40B4-BE49-F238E27FC236}">
+                <a16:creationId xmlns:a16="http://schemas.microsoft.com/office/drawing/2014/main" id="{1EEEFD83-1CDA-4AF4-B6F7-D2A1D5CF1B8A}"/>
+              </a:ext>
+            </a:extLst>
+          </p:cNvPr>
+          <p:cNvPicPr>
+            <a:picLocks noChangeAspect="1"/>
+          </p:cNvPicPr>
+          <p:nvPr/>
+        </p:nvPicPr>
+        <p:blipFill rotWithShape="1">
+          <a:blip r:embed="rId2">
+            <a:extLst>
+              <a:ext uri="{28A0092B-C50C-407E-A947-70E740481C1C}">
+                <a14:useLocalDpi xmlns:a14="http://schemas.microsoft.com/office/drawing/2010/main" val="0"/>
+              </a:ext>
+            </a:extLst>
+          </a:blip>
+          <a:srcRect l="34131" r="27808"/>
+          <a:stretch/>
+        </p:blipFill>
+        <p:spPr>
+          <a:xfrm>
+            <a:off x="7325031" y="0"/>
+            <a:ext cx="4500411" cy="6858000"/>
+          </a:xfrm>
+          <a:prstGeom prst="rect">
+            <a:avLst/>
+          </a:prstGeom>
+        </p:spPr>
+      </p:pic>
+    </p:spTree>
+    <p:extLst>
+      <p:ext uri="{BB962C8B-B14F-4D97-AF65-F5344CB8AC3E}">
+        <p14:creationId xmlns:p14="http://schemas.microsoft.com/office/powerpoint/2010/main" val="3906380192"/>
+      </p:ext>
+    </p:extLst>
+  </p:cSld>
+  <p:clrMapOvr>
+    <a:masterClrMapping/>
+  </p:clrMapOvr>
+</p:sld>
+</file>
+
+<file path=ppt/slides/slide13.xml><?xml version="1.0" encoding="utf-8"?>
+<p:sld xmlns:a="http://schemas.openxmlformats.org/drawingml/2006/main" xmlns:r="http://schemas.openxmlformats.org/officeDocument/2006/relationships" xmlns:p="http://schemas.openxmlformats.org/presentationml/2006/main">
+  <p:cSld>
+    <p:spTree>
+      <p:nvGrpSpPr>
+        <p:cNvPr id="1" name=""/>
+        <p:cNvGrpSpPr/>
+        <p:nvPr/>
+      </p:nvGrpSpPr>
+      <p:grpSpPr>
+        <a:xfrm>
+          <a:off x="0" y="0"/>
+          <a:ext cx="0" cy="0"/>
+          <a:chOff x="0" y="0"/>
+          <a:chExt cx="0" cy="0"/>
+        </a:xfrm>
+      </p:grpSpPr>
+      <p:sp>
+        <p:nvSpPr>
+          <p:cNvPr id="2" name="Title 1">
+            <a:extLst>
+              <a:ext uri="{FF2B5EF4-FFF2-40B4-BE49-F238E27FC236}">
+                <a16:creationId xmlns:a16="http://schemas.microsoft.com/office/drawing/2014/main" id="{2C70C716-7D1C-43AB-B6D0-DE3CCB30D180}"/>
+              </a:ext>
+            </a:extLst>
+          </p:cNvPr>
+          <p:cNvSpPr>
+            <a:spLocks noGrp="1"/>
+          </p:cNvSpPr>
+          <p:nvPr>
+            <p:ph type="title"/>
+          </p:nvPr>
+        </p:nvSpPr>
+        <p:spPr/>
+        <p:txBody>
+          <a:bodyPr/>
+          <a:lstStyle/>
+          <a:p>
+            <a:r>
+              <a:rPr lang="en-US" dirty="0" err="1"/>
+              <a:t>Cerastium</a:t>
+            </a:r>
+            <a:r>
+              <a:rPr lang="en-US" dirty="0"/>
+              <a:t> </a:t>
+            </a:r>
+            <a:r>
+              <a:rPr lang="en-US" dirty="0" err="1"/>
+              <a:t>arvense</a:t>
+            </a:r>
+            <a:endParaRPr lang="en-US" dirty="0"/>
+          </a:p>
+        </p:txBody>
+      </p:sp>
+      <p:pic>
+        <p:nvPicPr>
+          <p:cNvPr id="4" name="Picture 3" descr="Diagram&#10;&#10;Description automatically generated">
+            <a:extLst>
+              <a:ext uri="{FF2B5EF4-FFF2-40B4-BE49-F238E27FC236}">
+                <a16:creationId xmlns:a16="http://schemas.microsoft.com/office/drawing/2014/main" id="{05703BF8-7B96-41B1-ABE8-12C9A796BFEA}"/>
+              </a:ext>
+            </a:extLst>
+          </p:cNvPr>
+          <p:cNvPicPr>
+            <a:picLocks noChangeAspect="1"/>
+          </p:cNvPicPr>
+          <p:nvPr/>
+        </p:nvPicPr>
+        <p:blipFill rotWithShape="1">
+          <a:blip r:embed="rId2">
+            <a:extLst>
+              <a:ext uri="{28A0092B-C50C-407E-A947-70E740481C1C}">
+                <a14:useLocalDpi xmlns:a14="http://schemas.microsoft.com/office/drawing/2010/main" val="0"/>
+              </a:ext>
+            </a:extLst>
+          </a:blip>
+          <a:srcRect l="29615" r="26131"/>
+          <a:stretch/>
+        </p:blipFill>
+        <p:spPr>
+          <a:xfrm>
+            <a:off x="5476568" y="86310"/>
+            <a:ext cx="5166827" cy="6771690"/>
+          </a:xfrm>
+          <a:prstGeom prst="rect">
+            <a:avLst/>
+          </a:prstGeom>
+        </p:spPr>
+      </p:pic>
+    </p:spTree>
+    <p:extLst>
+      <p:ext uri="{BB962C8B-B14F-4D97-AF65-F5344CB8AC3E}">
+        <p14:creationId xmlns:p14="http://schemas.microsoft.com/office/powerpoint/2010/main" val="2016188048"/>
+      </p:ext>
+    </p:extLst>
+  </p:cSld>
+  <p:clrMapOvr>
+    <a:masterClrMapping/>
+  </p:clrMapOvr>
+</p:sld>
+</file>
+
+<file path=ppt/slides/slide14.xml><?xml version="1.0" encoding="utf-8"?>
+<p:sld xmlns:a="http://schemas.openxmlformats.org/drawingml/2006/main" xmlns:r="http://schemas.openxmlformats.org/officeDocument/2006/relationships" xmlns:p="http://schemas.openxmlformats.org/presentationml/2006/main">
+  <p:cSld>
+    <p:spTree>
+      <p:nvGrpSpPr>
+        <p:cNvPr id="1" name=""/>
+        <p:cNvGrpSpPr/>
+        <p:nvPr/>
+      </p:nvGrpSpPr>
+      <p:grpSpPr>
+        <a:xfrm>
+          <a:off x="0" y="0"/>
+          <a:ext cx="0" cy="0"/>
+          <a:chOff x="0" y="0"/>
+          <a:chExt cx="0" cy="0"/>
+        </a:xfrm>
+      </p:grpSpPr>
+      <p:sp>
+        <p:nvSpPr>
+          <p:cNvPr id="2" name="Title 1">
+            <a:extLst>
+              <a:ext uri="{FF2B5EF4-FFF2-40B4-BE49-F238E27FC236}">
+                <a16:creationId xmlns:a16="http://schemas.microsoft.com/office/drawing/2014/main" id="{C64EFCC8-FBAC-4537-A49A-1FE12FC8D5B0}"/>
+              </a:ext>
+            </a:extLst>
+          </p:cNvPr>
+          <p:cNvSpPr>
+            <a:spLocks noGrp="1"/>
+          </p:cNvSpPr>
+          <p:nvPr>
+            <p:ph type="title"/>
+          </p:nvPr>
+        </p:nvSpPr>
+        <p:spPr/>
+        <p:txBody>
+          <a:bodyPr/>
+          <a:lstStyle/>
+          <a:p>
+            <a:r>
+              <a:rPr lang="en-US" dirty="0"/>
+              <a:t>Cypripedium </a:t>
+            </a:r>
+            <a:r>
+              <a:rPr lang="en-US" dirty="0" err="1"/>
+              <a:t>candidum</a:t>
+            </a:r>
+            <a:endParaRPr lang="en-US" dirty="0"/>
+          </a:p>
+        </p:txBody>
+      </p:sp>
+      <p:pic>
+        <p:nvPicPr>
+          <p:cNvPr id="4" name="Picture 3" descr="Chart&#10;&#10;Description automatically generated">
+            <a:extLst>
+              <a:ext uri="{FF2B5EF4-FFF2-40B4-BE49-F238E27FC236}">
+                <a16:creationId xmlns:a16="http://schemas.microsoft.com/office/drawing/2014/main" id="{C4562E98-20B0-40AC-B552-8426C0E89930}"/>
+              </a:ext>
+            </a:extLst>
+          </p:cNvPr>
+          <p:cNvPicPr>
+            <a:picLocks noChangeAspect="1"/>
+          </p:cNvPicPr>
+          <p:nvPr/>
+        </p:nvPicPr>
+        <p:blipFill rotWithShape="1">
+          <a:blip r:embed="rId2">
+            <a:extLst>
+              <a:ext uri="{28A0092B-C50C-407E-A947-70E740481C1C}">
+                <a14:useLocalDpi xmlns:a14="http://schemas.microsoft.com/office/drawing/2010/main" val="0"/>
+              </a:ext>
+            </a:extLst>
+          </a:blip>
+          <a:srcRect l="32324" r="28195"/>
+          <a:stretch/>
+        </p:blipFill>
+        <p:spPr>
+          <a:xfrm>
+            <a:off x="6567948" y="0"/>
+            <a:ext cx="4668224" cy="6858000"/>
+          </a:xfrm>
+          <a:prstGeom prst="rect">
+            <a:avLst/>
+          </a:prstGeom>
+        </p:spPr>
+      </p:pic>
+    </p:spTree>
+    <p:extLst>
+      <p:ext uri="{BB962C8B-B14F-4D97-AF65-F5344CB8AC3E}">
+        <p14:creationId xmlns:p14="http://schemas.microsoft.com/office/powerpoint/2010/main" val="866478849"/>
+      </p:ext>
+    </p:extLst>
+  </p:cSld>
+  <p:clrMapOvr>
+    <a:masterClrMapping/>
+  </p:clrMapOvr>
+</p:sld>
+</file>
+
+<file path=ppt/slides/slide15.xml><?xml version="1.0" encoding="utf-8"?>
+<p:sld xmlns:a="http://schemas.openxmlformats.org/drawingml/2006/main" xmlns:r="http://schemas.openxmlformats.org/officeDocument/2006/relationships" xmlns:p="http://schemas.openxmlformats.org/presentationml/2006/main">
+  <p:cSld>
+    <p:spTree>
+      <p:nvGrpSpPr>
+        <p:cNvPr id="1" name=""/>
+        <p:cNvGrpSpPr/>
+        <p:nvPr/>
+      </p:nvGrpSpPr>
+      <p:grpSpPr>
+        <a:xfrm>
+          <a:off x="0" y="0"/>
+          <a:ext cx="0" cy="0"/>
+          <a:chOff x="0" y="0"/>
+          <a:chExt cx="0" cy="0"/>
+        </a:xfrm>
+      </p:grpSpPr>
+      <p:sp>
+        <p:nvSpPr>
+          <p:cNvPr id="2" name="Title 1">
+            <a:extLst>
+              <a:ext uri="{FF2B5EF4-FFF2-40B4-BE49-F238E27FC236}">
+                <a16:creationId xmlns:a16="http://schemas.microsoft.com/office/drawing/2014/main" id="{D7F77BD3-151F-47F5-88D9-17FEB7DC783A}"/>
+              </a:ext>
+            </a:extLst>
+          </p:cNvPr>
+          <p:cNvSpPr>
+            <a:spLocks noGrp="1"/>
+          </p:cNvSpPr>
+          <p:nvPr>
+            <p:ph type="title"/>
+          </p:nvPr>
+        </p:nvSpPr>
+        <p:spPr/>
+        <p:txBody>
+          <a:bodyPr/>
+          <a:lstStyle/>
+          <a:p>
+            <a:r>
+              <a:rPr lang="en-US" dirty="0" err="1"/>
+              <a:t>Oxytropis</a:t>
+            </a:r>
+            <a:r>
+              <a:rPr lang="en-US" dirty="0"/>
+              <a:t> </a:t>
+            </a:r>
+            <a:r>
+              <a:rPr lang="en-US" dirty="0" err="1"/>
+              <a:t>lambertii</a:t>
+            </a:r>
+            <a:endParaRPr lang="en-US" dirty="0"/>
+          </a:p>
+        </p:txBody>
+      </p:sp>
+      <p:pic>
+        <p:nvPicPr>
+          <p:cNvPr id="4" name="Picture 3" descr="Diagram&#10;&#10;Description automatically generated">
+            <a:extLst>
+              <a:ext uri="{FF2B5EF4-FFF2-40B4-BE49-F238E27FC236}">
+                <a16:creationId xmlns:a16="http://schemas.microsoft.com/office/drawing/2014/main" id="{B32D3137-EB62-4399-B961-E6ED436E0CBA}"/>
+              </a:ext>
+            </a:extLst>
+          </p:cNvPr>
+          <p:cNvPicPr>
+            <a:picLocks noChangeAspect="1"/>
+          </p:cNvPicPr>
+          <p:nvPr/>
+        </p:nvPicPr>
+        <p:blipFill rotWithShape="1">
+          <a:blip r:embed="rId2">
+            <a:extLst>
+              <a:ext uri="{28A0092B-C50C-407E-A947-70E740481C1C}">
+                <a14:useLocalDpi xmlns:a14="http://schemas.microsoft.com/office/drawing/2010/main" val="0"/>
+              </a:ext>
+            </a:extLst>
+          </a:blip>
+          <a:srcRect l="32969" r="27035"/>
+          <a:stretch/>
+        </p:blipFill>
+        <p:spPr>
+          <a:xfrm>
+            <a:off x="5761702" y="0"/>
+            <a:ext cx="4729245" cy="6858000"/>
+          </a:xfrm>
+          <a:prstGeom prst="rect">
+            <a:avLst/>
+          </a:prstGeom>
+        </p:spPr>
+      </p:pic>
+    </p:spTree>
+    <p:extLst>
+      <p:ext uri="{BB962C8B-B14F-4D97-AF65-F5344CB8AC3E}">
+        <p14:creationId xmlns:p14="http://schemas.microsoft.com/office/powerpoint/2010/main" val="2338265481"/>
+      </p:ext>
+    </p:extLst>
+  </p:cSld>
+  <p:clrMapOvr>
+    <a:masterClrMapping/>
+  </p:clrMapOvr>
+</p:sld>
+</file>
+
+<file path=ppt/slides/slide16.xml><?xml version="1.0" encoding="utf-8"?>
+<p:sld xmlns:a="http://schemas.openxmlformats.org/drawingml/2006/main" xmlns:r="http://schemas.openxmlformats.org/officeDocument/2006/relationships" xmlns:p="http://schemas.openxmlformats.org/presentationml/2006/main">
+  <p:cSld>
+    <p:spTree>
+      <p:nvGrpSpPr>
+        <p:cNvPr id="1" name=""/>
+        <p:cNvGrpSpPr/>
+        <p:nvPr/>
+      </p:nvGrpSpPr>
+      <p:grpSpPr>
+        <a:xfrm>
+          <a:off x="0" y="0"/>
+          <a:ext cx="0" cy="0"/>
+          <a:chOff x="0" y="0"/>
+          <a:chExt cx="0" cy="0"/>
+        </a:xfrm>
+      </p:grpSpPr>
+      <p:sp>
+        <p:nvSpPr>
+          <p:cNvPr id="2" name="Title 1">
+            <a:extLst>
+              <a:ext uri="{FF2B5EF4-FFF2-40B4-BE49-F238E27FC236}">
+                <a16:creationId xmlns:a16="http://schemas.microsoft.com/office/drawing/2014/main" id="{9F18EAA2-69C5-4CD8-B71B-064BFB87D239}"/>
+              </a:ext>
+            </a:extLst>
+          </p:cNvPr>
+          <p:cNvSpPr>
+            <a:spLocks noGrp="1"/>
+          </p:cNvSpPr>
+          <p:nvPr>
+            <p:ph type="title"/>
+          </p:nvPr>
+        </p:nvSpPr>
+        <p:spPr/>
+        <p:txBody>
+          <a:bodyPr/>
+          <a:lstStyle/>
+          <a:p>
+            <a:r>
+              <a:rPr lang="en-US" dirty="0" err="1"/>
+              <a:t>Pedicularis</a:t>
+            </a:r>
+            <a:r>
+              <a:rPr lang="en-US" dirty="0"/>
+              <a:t> canadensis</a:t>
+            </a:r>
+          </a:p>
+        </p:txBody>
+      </p:sp>
+      <p:pic>
+        <p:nvPicPr>
+          <p:cNvPr id="4" name="Picture 3" descr="Chart&#10;&#10;Description automatically generated">
+            <a:extLst>
+              <a:ext uri="{FF2B5EF4-FFF2-40B4-BE49-F238E27FC236}">
+                <a16:creationId xmlns:a16="http://schemas.microsoft.com/office/drawing/2014/main" id="{C4CCC2A3-8DAC-4565-9A9C-9B807E24B0B8}"/>
+              </a:ext>
+            </a:extLst>
+          </p:cNvPr>
+          <p:cNvPicPr>
+            <a:picLocks noChangeAspect="1"/>
+          </p:cNvPicPr>
+          <p:nvPr/>
+        </p:nvPicPr>
+        <p:blipFill rotWithShape="1">
+          <a:blip r:embed="rId2">
+            <a:extLst>
+              <a:ext uri="{28A0092B-C50C-407E-A947-70E740481C1C}">
+                <a14:useLocalDpi xmlns:a14="http://schemas.microsoft.com/office/drawing/2010/main" val="0"/>
+              </a:ext>
+            </a:extLst>
+          </a:blip>
+          <a:srcRect l="32840" r="27550"/>
+          <a:stretch/>
+        </p:blipFill>
+        <p:spPr>
+          <a:xfrm>
+            <a:off x="6017342" y="0"/>
+            <a:ext cx="4683478" cy="6858000"/>
+          </a:xfrm>
+          <a:prstGeom prst="rect">
+            <a:avLst/>
+          </a:prstGeom>
+        </p:spPr>
+      </p:pic>
+    </p:spTree>
+    <p:extLst>
+      <p:ext uri="{BB962C8B-B14F-4D97-AF65-F5344CB8AC3E}">
+        <p14:creationId xmlns:p14="http://schemas.microsoft.com/office/powerpoint/2010/main" val="1132679216"/>
+      </p:ext>
+    </p:extLst>
+  </p:cSld>
+  <p:clrMapOvr>
+    <a:masterClrMapping/>
+  </p:clrMapOvr>
+</p:sld>
+</file>
+
+<file path=ppt/slides/slide17.xml><?xml version="1.0" encoding="utf-8"?>
+<p:sld xmlns:a="http://schemas.openxmlformats.org/drawingml/2006/main" xmlns:r="http://schemas.openxmlformats.org/officeDocument/2006/relationships" xmlns:p="http://schemas.openxmlformats.org/presentationml/2006/main">
+  <p:cSld>
+    <p:spTree>
+      <p:nvGrpSpPr>
+        <p:cNvPr id="1" name=""/>
+        <p:cNvGrpSpPr/>
+        <p:nvPr/>
+      </p:nvGrpSpPr>
+      <p:grpSpPr>
+        <a:xfrm>
+          <a:off x="0" y="0"/>
+          <a:ext cx="0" cy="0"/>
+          <a:chOff x="0" y="0"/>
+          <a:chExt cx="0" cy="0"/>
+        </a:xfrm>
+      </p:grpSpPr>
+      <p:sp>
+        <p:nvSpPr>
+          <p:cNvPr id="2" name="Title 1">
+            <a:extLst>
+              <a:ext uri="{FF2B5EF4-FFF2-40B4-BE49-F238E27FC236}">
+                <a16:creationId xmlns:a16="http://schemas.microsoft.com/office/drawing/2014/main" id="{38A7DFB0-0305-4ADC-A6EC-B6F96D94841D}"/>
+              </a:ext>
+            </a:extLst>
+          </p:cNvPr>
+          <p:cNvSpPr>
+            <a:spLocks noGrp="1"/>
+          </p:cNvSpPr>
+          <p:nvPr>
+            <p:ph type="title"/>
+          </p:nvPr>
+        </p:nvSpPr>
+        <p:spPr/>
+        <p:txBody>
+          <a:bodyPr/>
+          <a:lstStyle/>
+          <a:p>
+            <a:r>
+              <a:rPr lang="en-US" dirty="0"/>
+              <a:t>Rosa </a:t>
+            </a:r>
+            <a:r>
+              <a:rPr lang="en-US" dirty="0" err="1"/>
+              <a:t>arkansana</a:t>
+            </a:r>
+            <a:endParaRPr lang="en-US" dirty="0"/>
+          </a:p>
+        </p:txBody>
+      </p:sp>
+      <p:pic>
+        <p:nvPicPr>
+          <p:cNvPr id="4" name="Picture 3" descr="Chart&#10;&#10;Description automatically generated">
+            <a:extLst>
+              <a:ext uri="{FF2B5EF4-FFF2-40B4-BE49-F238E27FC236}">
+                <a16:creationId xmlns:a16="http://schemas.microsoft.com/office/drawing/2014/main" id="{3526C8DF-FAD3-4188-B0D0-FB305F5CDC83}"/>
+              </a:ext>
+            </a:extLst>
+          </p:cNvPr>
+          <p:cNvPicPr>
+            <a:picLocks noChangeAspect="1"/>
+          </p:cNvPicPr>
+          <p:nvPr/>
+        </p:nvPicPr>
+        <p:blipFill rotWithShape="1">
+          <a:blip r:embed="rId2">
+            <a:extLst>
+              <a:ext uri="{28A0092B-C50C-407E-A947-70E740481C1C}">
+                <a14:useLocalDpi xmlns:a14="http://schemas.microsoft.com/office/drawing/2010/main" val="0"/>
+              </a:ext>
+            </a:extLst>
+          </a:blip>
+          <a:srcRect l="34775" r="27292"/>
+          <a:stretch/>
+        </p:blipFill>
+        <p:spPr>
+          <a:xfrm>
+            <a:off x="6243484" y="0"/>
+            <a:ext cx="4485154" cy="6858000"/>
+          </a:xfrm>
+          <a:prstGeom prst="rect">
+            <a:avLst/>
+          </a:prstGeom>
+        </p:spPr>
+      </p:pic>
+    </p:spTree>
+    <p:extLst>
+      <p:ext uri="{BB962C8B-B14F-4D97-AF65-F5344CB8AC3E}">
+        <p14:creationId xmlns:p14="http://schemas.microsoft.com/office/powerpoint/2010/main" val="405672287"/>
+      </p:ext>
+    </p:extLst>
+  </p:cSld>
+  <p:clrMapOvr>
+    <a:masterClrMapping/>
+  </p:clrMapOvr>
+</p:sld>
+</file>
+
+<file path=ppt/slides/slide18.xml><?xml version="1.0" encoding="utf-8"?>
+<p:sld xmlns:a="http://schemas.openxmlformats.org/drawingml/2006/main" xmlns:r="http://schemas.openxmlformats.org/officeDocument/2006/relationships" xmlns:p="http://schemas.openxmlformats.org/presentationml/2006/main">
+  <p:cSld>
+    <p:spTree>
+      <p:nvGrpSpPr>
+        <p:cNvPr id="1" name=""/>
+        <p:cNvGrpSpPr/>
+        <p:nvPr/>
+      </p:nvGrpSpPr>
+      <p:grpSpPr>
+        <a:xfrm>
+          <a:off x="0" y="0"/>
+          <a:ext cx="0" cy="0"/>
+          <a:chOff x="0" y="0"/>
+          <a:chExt cx="0" cy="0"/>
+        </a:xfrm>
+      </p:grpSpPr>
+      <p:sp>
+        <p:nvSpPr>
+          <p:cNvPr id="2" name="Title 1">
+            <a:extLst>
+              <a:ext uri="{FF2B5EF4-FFF2-40B4-BE49-F238E27FC236}">
+                <a16:creationId xmlns:a16="http://schemas.microsoft.com/office/drawing/2014/main" id="{86368883-5791-4212-AA15-E819B2BBF46F}"/>
+              </a:ext>
+            </a:extLst>
+          </p:cNvPr>
+          <p:cNvSpPr>
+            <a:spLocks noGrp="1"/>
+          </p:cNvSpPr>
+          <p:nvPr>
+            <p:ph type="title"/>
+          </p:nvPr>
+        </p:nvSpPr>
+        <p:spPr/>
+        <p:txBody>
+          <a:bodyPr/>
+          <a:lstStyle/>
+          <a:p>
+            <a:r>
+              <a:rPr lang="en-US" dirty="0"/>
+              <a:t>Sisyrinchium angustifolium</a:t>
+            </a:r>
+          </a:p>
+        </p:txBody>
+      </p:sp>
+      <p:pic>
+        <p:nvPicPr>
+          <p:cNvPr id="4" name="Picture 3" descr="A picture containing diagram&#10;&#10;Description automatically generated">
+            <a:extLst>
+              <a:ext uri="{FF2B5EF4-FFF2-40B4-BE49-F238E27FC236}">
+                <a16:creationId xmlns:a16="http://schemas.microsoft.com/office/drawing/2014/main" id="{455563E4-311E-465C-A8AD-90759E577158}"/>
+              </a:ext>
+            </a:extLst>
+          </p:cNvPr>
+          <p:cNvPicPr>
+            <a:picLocks noChangeAspect="1"/>
+          </p:cNvPicPr>
+          <p:nvPr/>
+        </p:nvPicPr>
+        <p:blipFill rotWithShape="1">
+          <a:blip r:embed="rId2">
+            <a:extLst>
+              <a:ext uri="{28A0092B-C50C-407E-A947-70E740481C1C}">
+                <a14:useLocalDpi xmlns:a14="http://schemas.microsoft.com/office/drawing/2010/main" val="0"/>
+              </a:ext>
+            </a:extLst>
+          </a:blip>
+          <a:srcRect l="33098" t="1511" r="27551" b="-1511"/>
+          <a:stretch/>
+        </p:blipFill>
+        <p:spPr>
+          <a:xfrm>
+            <a:off x="6528619" y="0"/>
+            <a:ext cx="4652968" cy="6858000"/>
+          </a:xfrm>
+          <a:prstGeom prst="rect">
+            <a:avLst/>
+          </a:prstGeom>
+        </p:spPr>
+      </p:pic>
+    </p:spTree>
+    <p:extLst>
+      <p:ext uri="{BB962C8B-B14F-4D97-AF65-F5344CB8AC3E}">
+        <p14:creationId xmlns:p14="http://schemas.microsoft.com/office/powerpoint/2010/main" val="1096431732"/>
+      </p:ext>
+    </p:extLst>
+  </p:cSld>
+  <p:clrMapOvr>
+    <a:masterClrMapping/>
+  </p:clrMapOvr>
+</p:sld>
+</file>
+
+<file path=ppt/slides/slide19.xml><?xml version="1.0" encoding="utf-8"?>
+<p:sld xmlns:a="http://schemas.openxmlformats.org/drawingml/2006/main" xmlns:r="http://schemas.openxmlformats.org/officeDocument/2006/relationships" xmlns:p="http://schemas.openxmlformats.org/presentationml/2006/main">
+  <p:cSld>
+    <p:spTree>
+      <p:nvGrpSpPr>
+        <p:cNvPr id="1" name=""/>
+        <p:cNvGrpSpPr/>
+        <p:nvPr/>
+      </p:nvGrpSpPr>
+      <p:grpSpPr>
+        <a:xfrm>
+          <a:off x="0" y="0"/>
+          <a:ext cx="0" cy="0"/>
+          <a:chOff x="0" y="0"/>
+          <a:chExt cx="0" cy="0"/>
+        </a:xfrm>
+      </p:grpSpPr>
+      <p:sp>
+        <p:nvSpPr>
+          <p:cNvPr id="2" name="Title 1">
+            <a:extLst>
+              <a:ext uri="{FF2B5EF4-FFF2-40B4-BE49-F238E27FC236}">
+                <a16:creationId xmlns:a16="http://schemas.microsoft.com/office/drawing/2014/main" id="{725896CD-A313-42C0-92EC-6206D139C2FD}"/>
+              </a:ext>
+            </a:extLst>
+          </p:cNvPr>
+          <p:cNvSpPr>
+            <a:spLocks noGrp="1"/>
+          </p:cNvSpPr>
+          <p:nvPr>
+            <p:ph type="title"/>
+          </p:nvPr>
+        </p:nvSpPr>
+        <p:spPr/>
+        <p:txBody>
+          <a:bodyPr/>
+          <a:lstStyle/>
+          <a:p>
+            <a:r>
+              <a:rPr lang="en-US" dirty="0"/>
+              <a:t>Vicia americana</a:t>
+            </a:r>
+          </a:p>
+        </p:txBody>
+      </p:sp>
+      <p:pic>
+        <p:nvPicPr>
+          <p:cNvPr id="4" name="Picture 3" descr="Chart, diagram&#10;&#10;Description automatically generated">
+            <a:extLst>
+              <a:ext uri="{FF2B5EF4-FFF2-40B4-BE49-F238E27FC236}">
+                <a16:creationId xmlns:a16="http://schemas.microsoft.com/office/drawing/2014/main" id="{B2F7E7A8-D3CC-41BD-8DBD-FB400597841F}"/>
+              </a:ext>
+            </a:extLst>
+          </p:cNvPr>
+          <p:cNvPicPr>
+            <a:picLocks noChangeAspect="1"/>
+          </p:cNvPicPr>
+          <p:nvPr/>
+        </p:nvPicPr>
+        <p:blipFill rotWithShape="1">
+          <a:blip r:embed="rId2">
+            <a:extLst>
+              <a:ext uri="{28A0092B-C50C-407E-A947-70E740481C1C}">
+                <a14:useLocalDpi xmlns:a14="http://schemas.microsoft.com/office/drawing/2010/main" val="0"/>
+              </a:ext>
+            </a:extLst>
+          </a:blip>
+          <a:srcRect l="31292" r="25873"/>
+          <a:stretch/>
+        </p:blipFill>
+        <p:spPr>
+          <a:xfrm>
+            <a:off x="5889523" y="0"/>
+            <a:ext cx="5064870" cy="6858000"/>
+          </a:xfrm>
+          <a:prstGeom prst="rect">
+            <a:avLst/>
+          </a:prstGeom>
+        </p:spPr>
+      </p:pic>
+    </p:spTree>
+    <p:extLst>
+      <p:ext uri="{BB962C8B-B14F-4D97-AF65-F5344CB8AC3E}">
+        <p14:creationId xmlns:p14="http://schemas.microsoft.com/office/powerpoint/2010/main" val="2335964877"/>
+      </p:ext>
+    </p:extLst>
+  </p:cSld>
+  <p:clrMapOvr>
+    <a:masterClrMapping/>
+  </p:clrMapOvr>
+</p:sld>
+</file>
+
 <file path=ppt/slides/slide2.xml><?xml version="1.0" encoding="utf-8"?>
 <p:sld xmlns:a="http://schemas.openxmlformats.org/drawingml/2006/main" xmlns:r="http://schemas.openxmlformats.org/officeDocument/2006/relationships" xmlns:p="http://schemas.openxmlformats.org/presentationml/2006/main">
   <p:cSld>
@@ -3810,6 +4713,99 @@
     <p:extLst>
       <p:ext uri="{BB962C8B-B14F-4D97-AF65-F5344CB8AC3E}">
         <p14:creationId xmlns:p14="http://schemas.microsoft.com/office/powerpoint/2010/main" val="3787983844"/>
+      </p:ext>
+    </p:extLst>
+  </p:cSld>
+  <p:clrMapOvr>
+    <a:masterClrMapping/>
+  </p:clrMapOvr>
+</p:sld>
+</file>
+
+<file path=ppt/slides/slide20.xml><?xml version="1.0" encoding="utf-8"?>
+<p:sld xmlns:a="http://schemas.openxmlformats.org/drawingml/2006/main" xmlns:r="http://schemas.openxmlformats.org/officeDocument/2006/relationships" xmlns:p="http://schemas.openxmlformats.org/presentationml/2006/main">
+  <p:cSld>
+    <p:spTree>
+      <p:nvGrpSpPr>
+        <p:cNvPr id="1" name=""/>
+        <p:cNvGrpSpPr/>
+        <p:nvPr/>
+      </p:nvGrpSpPr>
+      <p:grpSpPr>
+        <a:xfrm>
+          <a:off x="0" y="0"/>
+          <a:ext cx="0" cy="0"/>
+          <a:chOff x="0" y="0"/>
+          <a:chExt cx="0" cy="0"/>
+        </a:xfrm>
+      </p:grpSpPr>
+      <p:sp>
+        <p:nvSpPr>
+          <p:cNvPr id="2" name="Title 1">
+            <a:extLst>
+              <a:ext uri="{FF2B5EF4-FFF2-40B4-BE49-F238E27FC236}">
+                <a16:creationId xmlns:a16="http://schemas.microsoft.com/office/drawing/2014/main" id="{7C248522-B911-4CF8-BBE7-38B3DA1FD20E}"/>
+              </a:ext>
+            </a:extLst>
+          </p:cNvPr>
+          <p:cNvSpPr>
+            <a:spLocks noGrp="1"/>
+          </p:cNvSpPr>
+          <p:nvPr>
+            <p:ph type="title"/>
+          </p:nvPr>
+        </p:nvSpPr>
+        <p:spPr/>
+        <p:txBody>
+          <a:bodyPr/>
+          <a:lstStyle/>
+          <a:p>
+            <a:r>
+              <a:rPr lang="en-US" dirty="0"/>
+              <a:t>Zigadenus elegans</a:t>
+            </a:r>
+          </a:p>
+        </p:txBody>
+      </p:sp>
+      <p:pic>
+        <p:nvPicPr>
+          <p:cNvPr id="4" name="Picture 3" descr="Diagram&#10;&#10;Description automatically generated">
+            <a:extLst>
+              <a:ext uri="{FF2B5EF4-FFF2-40B4-BE49-F238E27FC236}">
+                <a16:creationId xmlns:a16="http://schemas.microsoft.com/office/drawing/2014/main" id="{9469E4F5-AAA2-45F4-BEC4-7DB648254A2A}"/>
+              </a:ext>
+            </a:extLst>
+          </p:cNvPr>
+          <p:cNvPicPr>
+            <a:picLocks noChangeAspect="1"/>
+          </p:cNvPicPr>
+          <p:nvPr/>
+        </p:nvPicPr>
+        <p:blipFill rotWithShape="1">
+          <a:blip r:embed="rId2">
+            <a:extLst>
+              <a:ext uri="{28A0092B-C50C-407E-A947-70E740481C1C}">
+                <a14:useLocalDpi xmlns:a14="http://schemas.microsoft.com/office/drawing/2010/main" val="0"/>
+              </a:ext>
+            </a:extLst>
+          </a:blip>
+          <a:srcRect l="29356" r="25100"/>
+          <a:stretch/>
+        </p:blipFill>
+        <p:spPr>
+          <a:xfrm>
+            <a:off x="5643715" y="0"/>
+            <a:ext cx="5385239" cy="6858000"/>
+          </a:xfrm>
+          <a:prstGeom prst="rect">
+            <a:avLst/>
+          </a:prstGeom>
+        </p:spPr>
+      </p:pic>
+    </p:spTree>
+    <p:extLst>
+      <p:ext uri="{BB962C8B-B14F-4D97-AF65-F5344CB8AC3E}">
+        <p14:creationId xmlns:p14="http://schemas.microsoft.com/office/powerpoint/2010/main" val="1981173109"/>
       </p:ext>
     </p:extLst>
   </p:cSld>
@@ -4631,6 +5627,41 @@
           </a:p>
         </p:txBody>
       </p:sp>
+      <p:pic>
+        <p:nvPicPr>
+          <p:cNvPr id="4" name="Picture 3" descr="Diagram&#10;&#10;Description automatically generated">
+            <a:extLst>
+              <a:ext uri="{FF2B5EF4-FFF2-40B4-BE49-F238E27FC236}">
+                <a16:creationId xmlns:a16="http://schemas.microsoft.com/office/drawing/2014/main" id="{112DD63C-BB1C-495B-B704-DA03396893FC}"/>
+              </a:ext>
+            </a:extLst>
+          </p:cNvPr>
+          <p:cNvPicPr>
+            <a:picLocks noChangeAspect="1"/>
+          </p:cNvPicPr>
+          <p:nvPr/>
+        </p:nvPicPr>
+        <p:blipFill rotWithShape="1">
+          <a:blip r:embed="rId2">
+            <a:extLst>
+              <a:ext uri="{28A0092B-C50C-407E-A947-70E740481C1C}">
+                <a14:useLocalDpi xmlns:a14="http://schemas.microsoft.com/office/drawing/2010/main" val="0"/>
+              </a:ext>
+            </a:extLst>
+          </a:blip>
+          <a:srcRect l="27808" r="24712"/>
+          <a:stretch/>
+        </p:blipFill>
+        <p:spPr>
+          <a:xfrm>
+            <a:off x="5614220" y="0"/>
+            <a:ext cx="5614072" cy="6858000"/>
+          </a:xfrm>
+          <a:prstGeom prst="rect">
+            <a:avLst/>
+          </a:prstGeom>
+        </p:spPr>
+      </p:pic>
     </p:spTree>
     <p:extLst>
       <p:ext uri="{BB962C8B-B14F-4D97-AF65-F5344CB8AC3E}">

</xml_diff>

<commit_message>
added altered path diagrams to powerpoint and saved changes to test2
</commit_message>
<xml_diff>
--- a/pathDiagrams.pptx
+++ b/pathDiagrams.pptx
@@ -278,7 +278,7 @@
           <a:p>
             <a:fld id="{45AB89E2-EB15-4EB7-81DE-388F1B5969A9}" type="datetimeFigureOut">
               <a:rPr lang="en-US" smtClean="0"/>
-              <a:t>10/8/2020</a:t>
+              <a:t>10/9/2020</a:t>
             </a:fld>
             <a:endParaRPr lang="en-US"/>
           </a:p>
@@ -476,7 +476,7 @@
           <a:p>
             <a:fld id="{45AB89E2-EB15-4EB7-81DE-388F1B5969A9}" type="datetimeFigureOut">
               <a:rPr lang="en-US" smtClean="0"/>
-              <a:t>10/8/2020</a:t>
+              <a:t>10/9/2020</a:t>
             </a:fld>
             <a:endParaRPr lang="en-US"/>
           </a:p>
@@ -684,7 +684,7 @@
           <a:p>
             <a:fld id="{45AB89E2-EB15-4EB7-81DE-388F1B5969A9}" type="datetimeFigureOut">
               <a:rPr lang="en-US" smtClean="0"/>
-              <a:t>10/8/2020</a:t>
+              <a:t>10/9/2020</a:t>
             </a:fld>
             <a:endParaRPr lang="en-US"/>
           </a:p>
@@ -882,7 +882,7 @@
           <a:p>
             <a:fld id="{45AB89E2-EB15-4EB7-81DE-388F1B5969A9}" type="datetimeFigureOut">
               <a:rPr lang="en-US" smtClean="0"/>
-              <a:t>10/8/2020</a:t>
+              <a:t>10/9/2020</a:t>
             </a:fld>
             <a:endParaRPr lang="en-US"/>
           </a:p>
@@ -1157,7 +1157,7 @@
           <a:p>
             <a:fld id="{45AB89E2-EB15-4EB7-81DE-388F1B5969A9}" type="datetimeFigureOut">
               <a:rPr lang="en-US" smtClean="0"/>
-              <a:t>10/8/2020</a:t>
+              <a:t>10/9/2020</a:t>
             </a:fld>
             <a:endParaRPr lang="en-US"/>
           </a:p>
@@ -1422,7 +1422,7 @@
           <a:p>
             <a:fld id="{45AB89E2-EB15-4EB7-81DE-388F1B5969A9}" type="datetimeFigureOut">
               <a:rPr lang="en-US" smtClean="0"/>
-              <a:t>10/8/2020</a:t>
+              <a:t>10/9/2020</a:t>
             </a:fld>
             <a:endParaRPr lang="en-US"/>
           </a:p>
@@ -1834,7 +1834,7 @@
           <a:p>
             <a:fld id="{45AB89E2-EB15-4EB7-81DE-388F1B5969A9}" type="datetimeFigureOut">
               <a:rPr lang="en-US" smtClean="0"/>
-              <a:t>10/8/2020</a:t>
+              <a:t>10/9/2020</a:t>
             </a:fld>
             <a:endParaRPr lang="en-US"/>
           </a:p>
@@ -1984,7 +1984,7 @@
           <a:p>
             <a:fld id="{45AB89E2-EB15-4EB7-81DE-388F1B5969A9}" type="datetimeFigureOut">
               <a:rPr lang="en-US" smtClean="0"/>
-              <a:t>10/8/2020</a:t>
+              <a:t>10/9/2020</a:t>
             </a:fld>
             <a:endParaRPr lang="en-US"/>
           </a:p>
@@ -2097,7 +2097,7 @@
           <a:p>
             <a:fld id="{45AB89E2-EB15-4EB7-81DE-388F1B5969A9}" type="datetimeFigureOut">
               <a:rPr lang="en-US" smtClean="0"/>
-              <a:t>10/8/2020</a:t>
+              <a:t>10/9/2020</a:t>
             </a:fld>
             <a:endParaRPr lang="en-US"/>
           </a:p>
@@ -2408,7 +2408,7 @@
           <a:p>
             <a:fld id="{45AB89E2-EB15-4EB7-81DE-388F1B5969A9}" type="datetimeFigureOut">
               <a:rPr lang="en-US" smtClean="0"/>
-              <a:t>10/8/2020</a:t>
+              <a:t>10/9/2020</a:t>
             </a:fld>
             <a:endParaRPr lang="en-US"/>
           </a:p>
@@ -2696,7 +2696,7 @@
           <a:p>
             <a:fld id="{45AB89E2-EB15-4EB7-81DE-388F1B5969A9}" type="datetimeFigureOut">
               <a:rPr lang="en-US" smtClean="0"/>
-              <a:t>10/8/2020</a:t>
+              <a:t>10/9/2020</a:t>
             </a:fld>
             <a:endParaRPr lang="en-US"/>
           </a:p>
@@ -2937,7 +2937,7 @@
           <a:p>
             <a:fld id="{45AB89E2-EB15-4EB7-81DE-388F1B5969A9}" type="datetimeFigureOut">
               <a:rPr lang="en-US" smtClean="0"/>
-              <a:t>10/8/2020</a:t>
+              <a:t>10/9/2020</a:t>
             </a:fld>
             <a:endParaRPr lang="en-US"/>
           </a:p>
@@ -5990,17 +5990,88 @@
               </a:ext>
             </a:extLst>
           </a:blip>
-          <a:srcRect l="27752" r="26001"/>
+          <a:srcRect l="31600" r="26001"/>
           <a:stretch/>
         </p:blipFill>
         <p:spPr>
           <a:xfrm>
-            <a:off x="6972299" y="106909"/>
-            <a:ext cx="5382947" cy="6751091"/>
+            <a:off x="7253837" y="53454"/>
+            <a:ext cx="4935115" cy="6751091"/>
           </a:xfrm>
           <a:prstGeom prst="rect">
             <a:avLst/>
           </a:prstGeom>
+          <a:ln>
+            <a:noFill/>
+          </a:ln>
+        </p:spPr>
+      </p:pic>
+      <p:pic>
+        <p:nvPicPr>
+          <p:cNvPr id="4" name="Picture 3">
+            <a:extLst>
+              <a:ext uri="{FF2B5EF4-FFF2-40B4-BE49-F238E27FC236}">
+                <a16:creationId xmlns:a16="http://schemas.microsoft.com/office/drawing/2014/main" id="{5DDEECC1-DF61-4048-BD42-1AF389C04913}"/>
+              </a:ext>
+            </a:extLst>
+          </p:cNvPr>
+          <p:cNvPicPr>
+            <a:picLocks noChangeAspect="1"/>
+          </p:cNvPicPr>
+          <p:nvPr/>
+        </p:nvPicPr>
+        <p:blipFill rotWithShape="1">
+          <a:blip r:embed="rId3"/>
+          <a:srcRect l="24016" r="27336"/>
+          <a:stretch/>
+        </p:blipFill>
+        <p:spPr>
+          <a:xfrm>
+            <a:off x="198121" y="334294"/>
+            <a:ext cx="3102964" cy="4000847"/>
+          </a:xfrm>
+          <a:prstGeom prst="rect">
+            <a:avLst/>
+          </a:prstGeom>
+          <a:ln>
+            <a:solidFill>
+              <a:schemeClr val="tx1"/>
+            </a:solidFill>
+          </a:ln>
+        </p:spPr>
+      </p:pic>
+      <p:pic>
+        <p:nvPicPr>
+          <p:cNvPr id="7" name="Picture 6">
+            <a:extLst>
+              <a:ext uri="{FF2B5EF4-FFF2-40B4-BE49-F238E27FC236}">
+                <a16:creationId xmlns:a16="http://schemas.microsoft.com/office/drawing/2014/main" id="{A71BA525-2293-4414-8E47-DDAF087F2FB1}"/>
+              </a:ext>
+            </a:extLst>
+          </p:cNvPr>
+          <p:cNvPicPr>
+            <a:picLocks noChangeAspect="1"/>
+          </p:cNvPicPr>
+          <p:nvPr/>
+        </p:nvPicPr>
+        <p:blipFill rotWithShape="1">
+          <a:blip r:embed="rId4"/>
+          <a:srcRect l="21642" r="22895"/>
+          <a:stretch/>
+        </p:blipFill>
+        <p:spPr>
+          <a:xfrm>
+            <a:off x="3716158" y="334294"/>
+            <a:ext cx="3537679" cy="4000847"/>
+          </a:xfrm>
+          <a:prstGeom prst="rect">
+            <a:avLst/>
+          </a:prstGeom>
+          <a:ln>
+            <a:solidFill>
+              <a:schemeClr val="tx1"/>
+            </a:solidFill>
+          </a:ln>
         </p:spPr>
       </p:pic>
     </p:spTree>

</xml_diff>

<commit_message>
stats comparisons of ranunculus rhomboides
</commit_message>
<xml_diff>
--- a/pathDiagrams.pptx
+++ b/pathDiagrams.pptx
@@ -25,6 +25,7 @@
     <p:sldId id="274" r:id="rId19"/>
     <p:sldId id="275" r:id="rId20"/>
     <p:sldId id="276" r:id="rId21"/>
+    <p:sldId id="277" r:id="rId22"/>
   </p:sldIdLst>
   <p:sldSz cx="12192000" cy="6858000"/>
   <p:notesSz cx="6858000" cy="9144000"/>
@@ -278,7 +279,7 @@
           <a:p>
             <a:fld id="{45AB89E2-EB15-4EB7-81DE-388F1B5969A9}" type="datetimeFigureOut">
               <a:rPr lang="en-US" smtClean="0"/>
-              <a:t>10/9/2020</a:t>
+              <a:t>10/12/2020</a:t>
             </a:fld>
             <a:endParaRPr lang="en-US"/>
           </a:p>
@@ -476,7 +477,7 @@
           <a:p>
             <a:fld id="{45AB89E2-EB15-4EB7-81DE-388F1B5969A9}" type="datetimeFigureOut">
               <a:rPr lang="en-US" smtClean="0"/>
-              <a:t>10/9/2020</a:t>
+              <a:t>10/12/2020</a:t>
             </a:fld>
             <a:endParaRPr lang="en-US"/>
           </a:p>
@@ -684,7 +685,7 @@
           <a:p>
             <a:fld id="{45AB89E2-EB15-4EB7-81DE-388F1B5969A9}" type="datetimeFigureOut">
               <a:rPr lang="en-US" smtClean="0"/>
-              <a:t>10/9/2020</a:t>
+              <a:t>10/12/2020</a:t>
             </a:fld>
             <a:endParaRPr lang="en-US"/>
           </a:p>
@@ -882,7 +883,7 @@
           <a:p>
             <a:fld id="{45AB89E2-EB15-4EB7-81DE-388F1B5969A9}" type="datetimeFigureOut">
               <a:rPr lang="en-US" smtClean="0"/>
-              <a:t>10/9/2020</a:t>
+              <a:t>10/12/2020</a:t>
             </a:fld>
             <a:endParaRPr lang="en-US"/>
           </a:p>
@@ -1157,7 +1158,7 @@
           <a:p>
             <a:fld id="{45AB89E2-EB15-4EB7-81DE-388F1B5969A9}" type="datetimeFigureOut">
               <a:rPr lang="en-US" smtClean="0"/>
-              <a:t>10/9/2020</a:t>
+              <a:t>10/12/2020</a:t>
             </a:fld>
             <a:endParaRPr lang="en-US"/>
           </a:p>
@@ -1422,7 +1423,7 @@
           <a:p>
             <a:fld id="{45AB89E2-EB15-4EB7-81DE-388F1B5969A9}" type="datetimeFigureOut">
               <a:rPr lang="en-US" smtClean="0"/>
-              <a:t>10/9/2020</a:t>
+              <a:t>10/12/2020</a:t>
             </a:fld>
             <a:endParaRPr lang="en-US"/>
           </a:p>
@@ -1834,7 +1835,7 @@
           <a:p>
             <a:fld id="{45AB89E2-EB15-4EB7-81DE-388F1B5969A9}" type="datetimeFigureOut">
               <a:rPr lang="en-US" smtClean="0"/>
-              <a:t>10/9/2020</a:t>
+              <a:t>10/12/2020</a:t>
             </a:fld>
             <a:endParaRPr lang="en-US"/>
           </a:p>
@@ -1984,7 +1985,7 @@
           <a:p>
             <a:fld id="{45AB89E2-EB15-4EB7-81DE-388F1B5969A9}" type="datetimeFigureOut">
               <a:rPr lang="en-US" smtClean="0"/>
-              <a:t>10/9/2020</a:t>
+              <a:t>10/12/2020</a:t>
             </a:fld>
             <a:endParaRPr lang="en-US"/>
           </a:p>
@@ -2097,7 +2098,7 @@
           <a:p>
             <a:fld id="{45AB89E2-EB15-4EB7-81DE-388F1B5969A9}" type="datetimeFigureOut">
               <a:rPr lang="en-US" smtClean="0"/>
-              <a:t>10/9/2020</a:t>
+              <a:t>10/12/2020</a:t>
             </a:fld>
             <a:endParaRPr lang="en-US"/>
           </a:p>
@@ -2408,7 +2409,7 @@
           <a:p>
             <a:fld id="{45AB89E2-EB15-4EB7-81DE-388F1B5969A9}" type="datetimeFigureOut">
               <a:rPr lang="en-US" smtClean="0"/>
-              <a:t>10/9/2020</a:t>
+              <a:t>10/12/2020</a:t>
             </a:fld>
             <a:endParaRPr lang="en-US"/>
           </a:p>
@@ -2696,7 +2697,7 @@
           <a:p>
             <a:fld id="{45AB89E2-EB15-4EB7-81DE-388F1B5969A9}" type="datetimeFigureOut">
               <a:rPr lang="en-US" smtClean="0"/>
-              <a:t>10/9/2020</a:t>
+              <a:t>10/12/2020</a:t>
             </a:fld>
             <a:endParaRPr lang="en-US"/>
           </a:p>
@@ -2937,7 +2938,7 @@
           <a:p>
             <a:fld id="{45AB89E2-EB15-4EB7-81DE-388F1B5969A9}" type="datetimeFigureOut">
               <a:rPr lang="en-US" smtClean="0"/>
-              <a:t>10/9/2020</a:t>
+              <a:t>10/12/2020</a:t>
             </a:fld>
             <a:endParaRPr lang="en-US"/>
           </a:p>
@@ -4815,6 +4816,93 @@
 </p:sld>
 </file>
 
+<file path=ppt/slides/slide21.xml><?xml version="1.0" encoding="utf-8"?>
+<p:sld xmlns:a="http://schemas.openxmlformats.org/drawingml/2006/main" xmlns:r="http://schemas.openxmlformats.org/officeDocument/2006/relationships" xmlns:p="http://schemas.openxmlformats.org/presentationml/2006/main">
+  <p:cSld>
+    <p:spTree>
+      <p:nvGrpSpPr>
+        <p:cNvPr id="1" name=""/>
+        <p:cNvGrpSpPr/>
+        <p:nvPr/>
+      </p:nvGrpSpPr>
+      <p:grpSpPr>
+        <a:xfrm>
+          <a:off x="0" y="0"/>
+          <a:ext cx="0" cy="0"/>
+          <a:chOff x="0" y="0"/>
+          <a:chExt cx="0" cy="0"/>
+        </a:xfrm>
+      </p:grpSpPr>
+      <p:sp>
+        <p:nvSpPr>
+          <p:cNvPr id="2" name="Title 1">
+            <a:extLst>
+              <a:ext uri="{FF2B5EF4-FFF2-40B4-BE49-F238E27FC236}">
+                <a16:creationId xmlns:a16="http://schemas.microsoft.com/office/drawing/2014/main" id="{A6169950-7C91-4D98-8D87-419E936C63A2}"/>
+              </a:ext>
+            </a:extLst>
+          </p:cNvPr>
+          <p:cNvSpPr>
+            <a:spLocks noGrp="1"/>
+          </p:cNvSpPr>
+          <p:nvPr>
+            <p:ph type="title"/>
+          </p:nvPr>
+        </p:nvSpPr>
+        <p:spPr/>
+        <p:txBody>
+          <a:bodyPr/>
+          <a:lstStyle/>
+          <a:p>
+            <a:r>
+              <a:rPr lang="en-US" dirty="0"/>
+              <a:t>Achillea millefolium</a:t>
+            </a:r>
+          </a:p>
+        </p:txBody>
+      </p:sp>
+      <p:pic>
+        <p:nvPicPr>
+          <p:cNvPr id="4" name="Picture 3">
+            <a:extLst>
+              <a:ext uri="{FF2B5EF4-FFF2-40B4-BE49-F238E27FC236}">
+                <a16:creationId xmlns:a16="http://schemas.microsoft.com/office/drawing/2014/main" id="{DAFC51CF-E51C-411B-9632-32C4322D9926}"/>
+              </a:ext>
+            </a:extLst>
+          </p:cNvPr>
+          <p:cNvPicPr>
+            <a:picLocks noChangeAspect="1"/>
+          </p:cNvPicPr>
+          <p:nvPr/>
+        </p:nvPicPr>
+        <p:blipFill rotWithShape="1">
+          <a:blip r:embed="rId2"/>
+          <a:srcRect l="27098" r="22650"/>
+          <a:stretch/>
+        </p:blipFill>
+        <p:spPr>
+          <a:xfrm>
+            <a:off x="6095999" y="0"/>
+            <a:ext cx="5494351" cy="6858000"/>
+          </a:xfrm>
+          <a:prstGeom prst="rect">
+            <a:avLst/>
+          </a:prstGeom>
+        </p:spPr>
+      </p:pic>
+    </p:spTree>
+    <p:extLst>
+      <p:ext uri="{BB962C8B-B14F-4D97-AF65-F5344CB8AC3E}">
+        <p14:creationId xmlns:p14="http://schemas.microsoft.com/office/powerpoint/2010/main" val="4073329858"/>
+      </p:ext>
+    </p:extLst>
+  </p:cSld>
+  <p:clrMapOvr>
+    <a:masterClrMapping/>
+  </p:clrMapOvr>
+</p:sld>
+</file>
+
 <file path=ppt/slides/slide3.xml><?xml version="1.0" encoding="utf-8"?>
 <p:sld xmlns:a="http://schemas.openxmlformats.org/drawingml/2006/main" xmlns:r="http://schemas.openxmlformats.org/officeDocument/2006/relationships" xmlns:p="http://schemas.openxmlformats.org/presentationml/2006/main">
   <p:cSld>

</xml_diff>

<commit_message>
Altered path analyses for all species, No DOBG seems to have the lowest AIC in all
</commit_message>
<xml_diff>
--- a/pathDiagrams.pptx
+++ b/pathDiagrams.pptx
@@ -279,7 +279,7 @@
           <a:p>
             <a:fld id="{45AB89E2-EB15-4EB7-81DE-388F1B5969A9}" type="datetimeFigureOut">
               <a:rPr lang="en-US" smtClean="0"/>
-              <a:t>10/12/2020</a:t>
+              <a:t>10/23/2020</a:t>
             </a:fld>
             <a:endParaRPr lang="en-US"/>
           </a:p>
@@ -477,7 +477,7 @@
           <a:p>
             <a:fld id="{45AB89E2-EB15-4EB7-81DE-388F1B5969A9}" type="datetimeFigureOut">
               <a:rPr lang="en-US" smtClean="0"/>
-              <a:t>10/12/2020</a:t>
+              <a:t>10/23/2020</a:t>
             </a:fld>
             <a:endParaRPr lang="en-US"/>
           </a:p>
@@ -685,7 +685,7 @@
           <a:p>
             <a:fld id="{45AB89E2-EB15-4EB7-81DE-388F1B5969A9}" type="datetimeFigureOut">
               <a:rPr lang="en-US" smtClean="0"/>
-              <a:t>10/12/2020</a:t>
+              <a:t>10/23/2020</a:t>
             </a:fld>
             <a:endParaRPr lang="en-US"/>
           </a:p>
@@ -883,7 +883,7 @@
           <a:p>
             <a:fld id="{45AB89E2-EB15-4EB7-81DE-388F1B5969A9}" type="datetimeFigureOut">
               <a:rPr lang="en-US" smtClean="0"/>
-              <a:t>10/12/2020</a:t>
+              <a:t>10/23/2020</a:t>
             </a:fld>
             <a:endParaRPr lang="en-US"/>
           </a:p>
@@ -1158,7 +1158,7 @@
           <a:p>
             <a:fld id="{45AB89E2-EB15-4EB7-81DE-388F1B5969A9}" type="datetimeFigureOut">
               <a:rPr lang="en-US" smtClean="0"/>
-              <a:t>10/12/2020</a:t>
+              <a:t>10/23/2020</a:t>
             </a:fld>
             <a:endParaRPr lang="en-US"/>
           </a:p>
@@ -1423,7 +1423,7 @@
           <a:p>
             <a:fld id="{45AB89E2-EB15-4EB7-81DE-388F1B5969A9}" type="datetimeFigureOut">
               <a:rPr lang="en-US" smtClean="0"/>
-              <a:t>10/12/2020</a:t>
+              <a:t>10/23/2020</a:t>
             </a:fld>
             <a:endParaRPr lang="en-US"/>
           </a:p>
@@ -1835,7 +1835,7 @@
           <a:p>
             <a:fld id="{45AB89E2-EB15-4EB7-81DE-388F1B5969A9}" type="datetimeFigureOut">
               <a:rPr lang="en-US" smtClean="0"/>
-              <a:t>10/12/2020</a:t>
+              <a:t>10/23/2020</a:t>
             </a:fld>
             <a:endParaRPr lang="en-US"/>
           </a:p>
@@ -1985,7 +1985,7 @@
           <a:p>
             <a:fld id="{45AB89E2-EB15-4EB7-81DE-388F1B5969A9}" type="datetimeFigureOut">
               <a:rPr lang="en-US" smtClean="0"/>
-              <a:t>10/12/2020</a:t>
+              <a:t>10/23/2020</a:t>
             </a:fld>
             <a:endParaRPr lang="en-US"/>
           </a:p>
@@ -2098,7 +2098,7 @@
           <a:p>
             <a:fld id="{45AB89E2-EB15-4EB7-81DE-388F1B5969A9}" type="datetimeFigureOut">
               <a:rPr lang="en-US" smtClean="0"/>
-              <a:t>10/12/2020</a:t>
+              <a:t>10/23/2020</a:t>
             </a:fld>
             <a:endParaRPr lang="en-US"/>
           </a:p>
@@ -2409,7 +2409,7 @@
           <a:p>
             <a:fld id="{45AB89E2-EB15-4EB7-81DE-388F1B5969A9}" type="datetimeFigureOut">
               <a:rPr lang="en-US" smtClean="0"/>
-              <a:t>10/12/2020</a:t>
+              <a:t>10/23/2020</a:t>
             </a:fld>
             <a:endParaRPr lang="en-US"/>
           </a:p>
@@ -2697,7 +2697,7 @@
           <a:p>
             <a:fld id="{45AB89E2-EB15-4EB7-81DE-388F1B5969A9}" type="datetimeFigureOut">
               <a:rPr lang="en-US" smtClean="0"/>
-              <a:t>10/12/2020</a:t>
+              <a:t>10/23/2020</a:t>
             </a:fld>
             <a:endParaRPr lang="en-US"/>
           </a:p>
@@ -2938,7 +2938,7 @@
           <a:p>
             <a:fld id="{45AB89E2-EB15-4EB7-81DE-388F1B5969A9}" type="datetimeFigureOut">
               <a:rPr lang="en-US" smtClean="0"/>
-              <a:t>10/12/2020</a:t>
+              <a:t>10/23/2020</a:t>
             </a:fld>
             <a:endParaRPr lang="en-US"/>
           </a:p>
@@ -3450,7 +3450,7 @@
         </p:blipFill>
         <p:spPr>
           <a:xfrm>
-            <a:off x="4637118" y="184804"/>
+            <a:off x="6094476" y="92402"/>
             <a:ext cx="6105691" cy="6673195"/>
           </a:xfrm>
           <a:prstGeom prst="rect">
@@ -3498,6 +3498,64 @@
           </a:p>
         </p:txBody>
       </p:sp>
+      <p:pic>
+        <p:nvPicPr>
+          <p:cNvPr id="5" name="Picture 4">
+            <a:extLst>
+              <a:ext uri="{FF2B5EF4-FFF2-40B4-BE49-F238E27FC236}">
+                <a16:creationId xmlns:a16="http://schemas.microsoft.com/office/drawing/2014/main" id="{4590D0EE-D07C-4681-8A0F-CC75A78E5136}"/>
+              </a:ext>
+            </a:extLst>
+          </p:cNvPr>
+          <p:cNvPicPr>
+            <a:picLocks noChangeAspect="1"/>
+          </p:cNvPicPr>
+          <p:nvPr/>
+        </p:nvPicPr>
+        <p:blipFill rotWithShape="1">
+          <a:blip r:embed="rId3"/>
+          <a:srcRect l="19843" r="19999"/>
+          <a:stretch/>
+        </p:blipFill>
+        <p:spPr>
+          <a:xfrm>
+            <a:off x="3425559" y="317158"/>
+            <a:ext cx="3805084" cy="4099915"/>
+          </a:xfrm>
+          <a:prstGeom prst="rect">
+            <a:avLst/>
+          </a:prstGeom>
+        </p:spPr>
+      </p:pic>
+      <p:pic>
+        <p:nvPicPr>
+          <p:cNvPr id="7" name="Picture 6">
+            <a:extLst>
+              <a:ext uri="{FF2B5EF4-FFF2-40B4-BE49-F238E27FC236}">
+                <a16:creationId xmlns:a16="http://schemas.microsoft.com/office/drawing/2014/main" id="{EECAF1AC-8F47-4367-9181-8305DBB95BC9}"/>
+              </a:ext>
+            </a:extLst>
+          </p:cNvPr>
+          <p:cNvPicPr>
+            <a:picLocks noChangeAspect="1"/>
+          </p:cNvPicPr>
+          <p:nvPr/>
+        </p:nvPicPr>
+        <p:blipFill rotWithShape="1">
+          <a:blip r:embed="rId4"/>
+          <a:srcRect l="25595" r="25906"/>
+          <a:stretch/>
+        </p:blipFill>
+        <p:spPr>
+          <a:xfrm>
+            <a:off x="357894" y="317158"/>
+            <a:ext cx="3067665" cy="4099915"/>
+          </a:xfrm>
+          <a:prstGeom prst="rect">
+            <a:avLst/>
+          </a:prstGeom>
+        </p:spPr>
+      </p:pic>
     </p:spTree>
     <p:extLst>
       <p:ext uri="{BB962C8B-B14F-4D97-AF65-F5344CB8AC3E}">
@@ -3661,8 +3719,66 @@
         </p:blipFill>
         <p:spPr>
           <a:xfrm>
-            <a:off x="4838006" y="0"/>
+            <a:off x="7038109" y="-47626"/>
             <a:ext cx="5153891" cy="6905626"/>
+          </a:xfrm>
+          <a:prstGeom prst="rect">
+            <a:avLst/>
+          </a:prstGeom>
+        </p:spPr>
+      </p:pic>
+      <p:pic>
+        <p:nvPicPr>
+          <p:cNvPr id="5" name="Picture 4">
+            <a:extLst>
+              <a:ext uri="{FF2B5EF4-FFF2-40B4-BE49-F238E27FC236}">
+                <a16:creationId xmlns:a16="http://schemas.microsoft.com/office/drawing/2014/main" id="{E7F6CBF1-0DE9-4598-8ECF-00B717AD398D}"/>
+              </a:ext>
+            </a:extLst>
+          </p:cNvPr>
+          <p:cNvPicPr>
+            <a:picLocks noChangeAspect="1"/>
+          </p:cNvPicPr>
+          <p:nvPr/>
+        </p:nvPicPr>
+        <p:blipFill rotWithShape="1">
+          <a:blip r:embed="rId3"/>
+          <a:srcRect l="11760" r="12848"/>
+          <a:stretch/>
+        </p:blipFill>
+        <p:spPr>
+          <a:xfrm>
+            <a:off x="117986" y="119821"/>
+            <a:ext cx="3776857" cy="4665601"/>
+          </a:xfrm>
+          <a:prstGeom prst="rect">
+            <a:avLst/>
+          </a:prstGeom>
+        </p:spPr>
+      </p:pic>
+      <p:pic>
+        <p:nvPicPr>
+          <p:cNvPr id="7" name="Picture 6">
+            <a:extLst>
+              <a:ext uri="{FF2B5EF4-FFF2-40B4-BE49-F238E27FC236}">
+                <a16:creationId xmlns:a16="http://schemas.microsoft.com/office/drawing/2014/main" id="{58D3041B-AEF4-447A-A3B6-DC45F4A84711}"/>
+              </a:ext>
+            </a:extLst>
+          </p:cNvPr>
+          <p:cNvPicPr>
+            <a:picLocks noChangeAspect="1"/>
+          </p:cNvPicPr>
+          <p:nvPr/>
+        </p:nvPicPr>
+        <p:blipFill rotWithShape="1">
+          <a:blip r:embed="rId4"/>
+          <a:srcRect l="7563" r="8029"/>
+          <a:stretch/>
+        </p:blipFill>
+        <p:spPr>
+          <a:xfrm>
+            <a:off x="4109884" y="837576"/>
+            <a:ext cx="3491513" cy="3852411"/>
           </a:xfrm>
           <a:prstGeom prst="rect">
             <a:avLst/>
@@ -3759,8 +3875,66 @@
         </p:blipFill>
         <p:spPr>
           <a:xfrm>
-            <a:off x="5879690" y="0"/>
+            <a:off x="7264430" y="88490"/>
             <a:ext cx="4927570" cy="6858000"/>
+          </a:xfrm>
+          <a:prstGeom prst="rect">
+            <a:avLst/>
+          </a:prstGeom>
+        </p:spPr>
+      </p:pic>
+      <p:pic>
+        <p:nvPicPr>
+          <p:cNvPr id="4" name="Picture 3">
+            <a:extLst>
+              <a:ext uri="{FF2B5EF4-FFF2-40B4-BE49-F238E27FC236}">
+                <a16:creationId xmlns:a16="http://schemas.microsoft.com/office/drawing/2014/main" id="{2282F22F-7B2E-42A3-AD47-89237416B0F9}"/>
+              </a:ext>
+            </a:extLst>
+          </p:cNvPr>
+          <p:cNvPicPr>
+            <a:picLocks noChangeAspect="1"/>
+          </p:cNvPicPr>
+          <p:nvPr/>
+        </p:nvPicPr>
+        <p:blipFill rotWithShape="1">
+          <a:blip r:embed="rId3"/>
+          <a:srcRect l="24972" r="23264"/>
+          <a:stretch/>
+        </p:blipFill>
+        <p:spPr>
+          <a:xfrm>
+            <a:off x="388374" y="599166"/>
+            <a:ext cx="3274142" cy="4099915"/>
+          </a:xfrm>
+          <a:prstGeom prst="rect">
+            <a:avLst/>
+          </a:prstGeom>
+        </p:spPr>
+      </p:pic>
+      <p:pic>
+        <p:nvPicPr>
+          <p:cNvPr id="7" name="Picture 6">
+            <a:extLst>
+              <a:ext uri="{FF2B5EF4-FFF2-40B4-BE49-F238E27FC236}">
+                <a16:creationId xmlns:a16="http://schemas.microsoft.com/office/drawing/2014/main" id="{5EE24AEE-8788-4437-8248-5C82498D0128}"/>
+              </a:ext>
+            </a:extLst>
+          </p:cNvPr>
+          <p:cNvPicPr>
+            <a:picLocks noChangeAspect="1"/>
+          </p:cNvPicPr>
+          <p:nvPr/>
+        </p:nvPicPr>
+        <p:blipFill rotWithShape="1">
+          <a:blip r:embed="rId4"/>
+          <a:srcRect l="19999" r="20154"/>
+          <a:stretch/>
+        </p:blipFill>
+        <p:spPr>
+          <a:xfrm>
+            <a:off x="3753464" y="752372"/>
+            <a:ext cx="3785420" cy="4099915"/>
           </a:xfrm>
           <a:prstGeom prst="rect">
             <a:avLst/>
@@ -3857,8 +4031,66 @@
         </p:blipFill>
         <p:spPr>
           <a:xfrm>
-            <a:off x="7325031" y="0"/>
+            <a:off x="7698657" y="-5651"/>
             <a:ext cx="4500411" cy="6858000"/>
+          </a:xfrm>
+          <a:prstGeom prst="rect">
+            <a:avLst/>
+          </a:prstGeom>
+        </p:spPr>
+      </p:pic>
+      <p:pic>
+        <p:nvPicPr>
+          <p:cNvPr id="5" name="Picture 4">
+            <a:extLst>
+              <a:ext uri="{FF2B5EF4-FFF2-40B4-BE49-F238E27FC236}">
+                <a16:creationId xmlns:a16="http://schemas.microsoft.com/office/drawing/2014/main" id="{7AE1BA8D-B7C8-4E98-B223-51E66B385B24}"/>
+              </a:ext>
+            </a:extLst>
+          </p:cNvPr>
+          <p:cNvPicPr>
+            <a:picLocks noChangeAspect="1"/>
+          </p:cNvPicPr>
+          <p:nvPr/>
+        </p:nvPicPr>
+        <p:blipFill rotWithShape="1">
+          <a:blip r:embed="rId3"/>
+          <a:srcRect l="24351" r="24662"/>
+          <a:stretch/>
+        </p:blipFill>
+        <p:spPr>
+          <a:xfrm>
+            <a:off x="167147" y="385984"/>
+            <a:ext cx="3224981" cy="4099915"/>
+          </a:xfrm>
+          <a:prstGeom prst="rect">
+            <a:avLst/>
+          </a:prstGeom>
+        </p:spPr>
+      </p:pic>
+      <p:pic>
+        <p:nvPicPr>
+          <p:cNvPr id="7" name="Picture 6">
+            <a:extLst>
+              <a:ext uri="{FF2B5EF4-FFF2-40B4-BE49-F238E27FC236}">
+                <a16:creationId xmlns:a16="http://schemas.microsoft.com/office/drawing/2014/main" id="{1950FD40-1019-44B8-B844-9456CB754D3A}"/>
+              </a:ext>
+            </a:extLst>
+          </p:cNvPr>
+          <p:cNvPicPr>
+            <a:picLocks noChangeAspect="1"/>
+          </p:cNvPicPr>
+          <p:nvPr/>
+        </p:nvPicPr>
+        <p:blipFill rotWithShape="1">
+          <a:blip r:embed="rId4"/>
+          <a:srcRect l="22331" r="24662"/>
+          <a:stretch/>
+        </p:blipFill>
+        <p:spPr>
+          <a:xfrm>
+            <a:off x="3746090" y="385984"/>
+            <a:ext cx="3352799" cy="4099915"/>
           </a:xfrm>
           <a:prstGeom prst="rect">
             <a:avLst/>
@@ -3959,8 +4191,66 @@
         </p:blipFill>
         <p:spPr>
           <a:xfrm>
-            <a:off x="5476568" y="86310"/>
+            <a:off x="7025173" y="0"/>
             <a:ext cx="5166827" cy="6771690"/>
+          </a:xfrm>
+          <a:prstGeom prst="rect">
+            <a:avLst/>
+          </a:prstGeom>
+        </p:spPr>
+      </p:pic>
+      <p:pic>
+        <p:nvPicPr>
+          <p:cNvPr id="5" name="Picture 4">
+            <a:extLst>
+              <a:ext uri="{FF2B5EF4-FFF2-40B4-BE49-F238E27FC236}">
+                <a16:creationId xmlns:a16="http://schemas.microsoft.com/office/drawing/2014/main" id="{57540F7E-4423-4CEE-ADA9-BAF1E4821B15}"/>
+              </a:ext>
+            </a:extLst>
+          </p:cNvPr>
+          <p:cNvPicPr>
+            <a:picLocks noChangeAspect="1"/>
+          </p:cNvPicPr>
+          <p:nvPr/>
+        </p:nvPicPr>
+        <p:blipFill rotWithShape="1">
+          <a:blip r:embed="rId3"/>
+          <a:srcRect l="15957" r="13315"/>
+          <a:stretch/>
+        </p:blipFill>
+        <p:spPr>
+          <a:xfrm>
+            <a:off x="393290" y="266428"/>
+            <a:ext cx="3179548" cy="4186708"/>
+          </a:xfrm>
+          <a:prstGeom prst="rect">
+            <a:avLst/>
+          </a:prstGeom>
+        </p:spPr>
+      </p:pic>
+      <p:pic>
+        <p:nvPicPr>
+          <p:cNvPr id="7" name="Picture 6">
+            <a:extLst>
+              <a:ext uri="{FF2B5EF4-FFF2-40B4-BE49-F238E27FC236}">
+                <a16:creationId xmlns:a16="http://schemas.microsoft.com/office/drawing/2014/main" id="{920E96C3-6D39-447F-B102-ABAA90380D4C}"/>
+              </a:ext>
+            </a:extLst>
+          </p:cNvPr>
+          <p:cNvPicPr>
+            <a:picLocks noChangeAspect="1"/>
+          </p:cNvPicPr>
+          <p:nvPr/>
+        </p:nvPicPr>
+        <p:blipFill rotWithShape="1">
+          <a:blip r:embed="rId4"/>
+          <a:srcRect l="10109" r="10109"/>
+          <a:stretch/>
+        </p:blipFill>
+        <p:spPr>
+          <a:xfrm>
+            <a:off x="3655374" y="401344"/>
+            <a:ext cx="3791361" cy="4425801"/>
           </a:xfrm>
           <a:prstGeom prst="rect">
             <a:avLst/>
@@ -4057,8 +4347,66 @@
         </p:blipFill>
         <p:spPr>
           <a:xfrm>
-            <a:off x="6567948" y="0"/>
+            <a:off x="7354528" y="0"/>
             <a:ext cx="4668224" cy="6858000"/>
+          </a:xfrm>
+          <a:prstGeom prst="rect">
+            <a:avLst/>
+          </a:prstGeom>
+        </p:spPr>
+      </p:pic>
+      <p:pic>
+        <p:nvPicPr>
+          <p:cNvPr id="5" name="Picture 4">
+            <a:extLst>
+              <a:ext uri="{FF2B5EF4-FFF2-40B4-BE49-F238E27FC236}">
+                <a16:creationId xmlns:a16="http://schemas.microsoft.com/office/drawing/2014/main" id="{C9444519-E1D1-48D7-BB9C-5F7A0552AAD7}"/>
+              </a:ext>
+            </a:extLst>
+          </p:cNvPr>
+          <p:cNvPicPr>
+            <a:picLocks noChangeAspect="1"/>
+          </p:cNvPicPr>
+          <p:nvPr/>
+        </p:nvPicPr>
+        <p:blipFill rotWithShape="1">
+          <a:blip r:embed="rId3"/>
+          <a:srcRect l="17823" r="17356"/>
+          <a:stretch/>
+        </p:blipFill>
+        <p:spPr>
+          <a:xfrm>
+            <a:off x="427636" y="297445"/>
+            <a:ext cx="3002966" cy="4314527"/>
+          </a:xfrm>
+          <a:prstGeom prst="rect">
+            <a:avLst/>
+          </a:prstGeom>
+        </p:spPr>
+      </p:pic>
+      <p:pic>
+        <p:nvPicPr>
+          <p:cNvPr id="7" name="Picture 6">
+            <a:extLst>
+              <a:ext uri="{FF2B5EF4-FFF2-40B4-BE49-F238E27FC236}">
+                <a16:creationId xmlns:a16="http://schemas.microsoft.com/office/drawing/2014/main" id="{88A94143-1DB3-41CF-9B3C-CD134A5AF952}"/>
+              </a:ext>
+            </a:extLst>
+          </p:cNvPr>
+          <p:cNvPicPr>
+            <a:picLocks noChangeAspect="1"/>
+          </p:cNvPicPr>
+          <p:nvPr/>
+        </p:nvPicPr>
+        <p:blipFill rotWithShape="1">
+          <a:blip r:embed="rId4"/>
+          <a:srcRect l="11449" r="7860"/>
+          <a:stretch/>
+        </p:blipFill>
+        <p:spPr>
+          <a:xfrm>
+            <a:off x="3657600" y="483615"/>
+            <a:ext cx="3925546" cy="4530837"/>
           </a:xfrm>
           <a:prstGeom prst="rect">
             <a:avLst/>
@@ -4159,8 +4507,66 @@
         </p:blipFill>
         <p:spPr>
           <a:xfrm>
-            <a:off x="5761702" y="0"/>
+            <a:off x="7393857" y="-147483"/>
             <a:ext cx="4729245" cy="6858000"/>
+          </a:xfrm>
+          <a:prstGeom prst="rect">
+            <a:avLst/>
+          </a:prstGeom>
+        </p:spPr>
+      </p:pic>
+      <p:pic>
+        <p:nvPicPr>
+          <p:cNvPr id="5" name="Picture 4">
+            <a:extLst>
+              <a:ext uri="{FF2B5EF4-FFF2-40B4-BE49-F238E27FC236}">
+                <a16:creationId xmlns:a16="http://schemas.microsoft.com/office/drawing/2014/main" id="{8BCF813A-C95E-40BB-80B7-5CE1A705FC77}"/>
+              </a:ext>
+            </a:extLst>
+          </p:cNvPr>
+          <p:cNvPicPr>
+            <a:picLocks noChangeAspect="1"/>
+          </p:cNvPicPr>
+          <p:nvPr/>
+        </p:nvPicPr>
+        <p:blipFill rotWithShape="1">
+          <a:blip r:embed="rId3"/>
+          <a:srcRect l="25439" r="26372"/>
+          <a:stretch/>
+        </p:blipFill>
+        <p:spPr>
+          <a:xfrm>
+            <a:off x="599766" y="297494"/>
+            <a:ext cx="3657601" cy="4919899"/>
+          </a:xfrm>
+          <a:prstGeom prst="rect">
+            <a:avLst/>
+          </a:prstGeom>
+        </p:spPr>
+      </p:pic>
+      <p:pic>
+        <p:nvPicPr>
+          <p:cNvPr id="7" name="Picture 6">
+            <a:extLst>
+              <a:ext uri="{FF2B5EF4-FFF2-40B4-BE49-F238E27FC236}">
+                <a16:creationId xmlns:a16="http://schemas.microsoft.com/office/drawing/2014/main" id="{A9CC46E8-D6DF-4108-8299-6E96596DC9C5}"/>
+              </a:ext>
+            </a:extLst>
+          </p:cNvPr>
+          <p:cNvPicPr>
+            <a:picLocks noChangeAspect="1"/>
+          </p:cNvPicPr>
+          <p:nvPr/>
+        </p:nvPicPr>
+        <p:blipFill rotWithShape="1">
+          <a:blip r:embed="rId4"/>
+          <a:srcRect l="25777" r="22641"/>
+          <a:stretch/>
+        </p:blipFill>
+        <p:spPr>
+          <a:xfrm>
+            <a:off x="4257367" y="367641"/>
+            <a:ext cx="3408307" cy="4283017"/>
           </a:xfrm>
           <a:prstGeom prst="rect">
             <a:avLst/>
@@ -4256,8 +4662,66 @@
         </p:blipFill>
         <p:spPr>
           <a:xfrm>
-            <a:off x="6017342" y="0"/>
+            <a:off x="7551174" y="0"/>
             <a:ext cx="4683478" cy="6858000"/>
+          </a:xfrm>
+          <a:prstGeom prst="rect">
+            <a:avLst/>
+          </a:prstGeom>
+        </p:spPr>
+      </p:pic>
+      <p:pic>
+        <p:nvPicPr>
+          <p:cNvPr id="5" name="Picture 4">
+            <a:extLst>
+              <a:ext uri="{FF2B5EF4-FFF2-40B4-BE49-F238E27FC236}">
+                <a16:creationId xmlns:a16="http://schemas.microsoft.com/office/drawing/2014/main" id="{D47B0148-9863-46C5-B848-F4562CFCC0B6}"/>
+              </a:ext>
+            </a:extLst>
+          </p:cNvPr>
+          <p:cNvPicPr>
+            <a:picLocks noChangeAspect="1"/>
+          </p:cNvPicPr>
+          <p:nvPr/>
+        </p:nvPicPr>
+        <p:blipFill rotWithShape="1">
+          <a:blip r:embed="rId3"/>
+          <a:srcRect l="11085" r="14869"/>
+          <a:stretch/>
+        </p:blipFill>
+        <p:spPr>
+          <a:xfrm>
+            <a:off x="0" y="237809"/>
+            <a:ext cx="3774236" cy="4747146"/>
+          </a:xfrm>
+          <a:prstGeom prst="rect">
+            <a:avLst/>
+          </a:prstGeom>
+        </p:spPr>
+      </p:pic>
+      <p:pic>
+        <p:nvPicPr>
+          <p:cNvPr id="7" name="Picture 6">
+            <a:extLst>
+              <a:ext uri="{FF2B5EF4-FFF2-40B4-BE49-F238E27FC236}">
+                <a16:creationId xmlns:a16="http://schemas.microsoft.com/office/drawing/2014/main" id="{B57DD9DF-3134-4A87-98F7-0DF748AEFB5F}"/>
+              </a:ext>
+            </a:extLst>
+          </p:cNvPr>
+          <p:cNvPicPr>
+            <a:picLocks noChangeAspect="1"/>
+          </p:cNvPicPr>
+          <p:nvPr/>
+        </p:nvPicPr>
+        <p:blipFill rotWithShape="1">
+          <a:blip r:embed="rId4"/>
+          <a:srcRect l="13293" r="8029"/>
+          <a:stretch/>
+        </p:blipFill>
+        <p:spPr>
+          <a:xfrm>
+            <a:off x="3774236" y="270425"/>
+            <a:ext cx="3927288" cy="4648824"/>
           </a:xfrm>
           <a:prstGeom prst="rect">
             <a:avLst/>
@@ -4354,8 +4818,66 @@
         </p:blipFill>
         <p:spPr>
           <a:xfrm>
-            <a:off x="6243484" y="0"/>
+            <a:off x="7756441" y="0"/>
             <a:ext cx="4485154" cy="6858000"/>
+          </a:xfrm>
+          <a:prstGeom prst="rect">
+            <a:avLst/>
+          </a:prstGeom>
+        </p:spPr>
+      </p:pic>
+      <p:pic>
+        <p:nvPicPr>
+          <p:cNvPr id="5" name="Picture 4">
+            <a:extLst>
+              <a:ext uri="{FF2B5EF4-FFF2-40B4-BE49-F238E27FC236}">
+                <a16:creationId xmlns:a16="http://schemas.microsoft.com/office/drawing/2014/main" id="{D34A9236-7372-40EA-BC57-4611F6249923}"/>
+              </a:ext>
+            </a:extLst>
+          </p:cNvPr>
+          <p:cNvPicPr>
+            <a:picLocks noChangeAspect="1"/>
+          </p:cNvPicPr>
+          <p:nvPr/>
+        </p:nvPicPr>
+        <p:blipFill rotWithShape="1">
+          <a:blip r:embed="rId3"/>
+          <a:srcRect l="15180" r="15646"/>
+          <a:stretch/>
+        </p:blipFill>
+        <p:spPr>
+          <a:xfrm>
+            <a:off x="206477" y="140129"/>
+            <a:ext cx="3438297" cy="4629159"/>
+          </a:xfrm>
+          <a:prstGeom prst="rect">
+            <a:avLst/>
+          </a:prstGeom>
+        </p:spPr>
+      </p:pic>
+      <p:pic>
+        <p:nvPicPr>
+          <p:cNvPr id="7" name="Picture 6">
+            <a:extLst>
+              <a:ext uri="{FF2B5EF4-FFF2-40B4-BE49-F238E27FC236}">
+                <a16:creationId xmlns:a16="http://schemas.microsoft.com/office/drawing/2014/main" id="{F6AF7BE2-2177-420C-BF2C-7296B0482DEA}"/>
+              </a:ext>
+            </a:extLst>
+          </p:cNvPr>
+          <p:cNvPicPr>
+            <a:picLocks noChangeAspect="1"/>
+          </p:cNvPicPr>
+          <p:nvPr/>
+        </p:nvPicPr>
+        <p:blipFill rotWithShape="1">
+          <a:blip r:embed="rId4"/>
+          <a:srcRect l="8029" r="8495"/>
+          <a:stretch/>
+        </p:blipFill>
+        <p:spPr>
+          <a:xfrm>
+            <a:off x="3644775" y="181934"/>
+            <a:ext cx="4111666" cy="4587354"/>
           </a:xfrm>
           <a:prstGeom prst="rect">
             <a:avLst/>
@@ -4447,8 +4969,66 @@
         </p:blipFill>
         <p:spPr>
           <a:xfrm>
-            <a:off x="6528619" y="0"/>
+            <a:off x="7245777" y="0"/>
             <a:ext cx="4652968" cy="6858000"/>
+          </a:xfrm>
+          <a:prstGeom prst="rect">
+            <a:avLst/>
+          </a:prstGeom>
+        </p:spPr>
+      </p:pic>
+      <p:pic>
+        <p:nvPicPr>
+          <p:cNvPr id="5" name="Picture 4">
+            <a:extLst>
+              <a:ext uri="{FF2B5EF4-FFF2-40B4-BE49-F238E27FC236}">
+                <a16:creationId xmlns:a16="http://schemas.microsoft.com/office/drawing/2014/main" id="{BF586F98-174D-4C62-87A0-9024BC457066}"/>
+              </a:ext>
+            </a:extLst>
+          </p:cNvPr>
+          <p:cNvPicPr>
+            <a:picLocks noChangeAspect="1"/>
+          </p:cNvPicPr>
+          <p:nvPr/>
+        </p:nvPicPr>
+        <p:blipFill rotWithShape="1">
+          <a:blip r:embed="rId3"/>
+          <a:srcRect l="15647" r="16578"/>
+          <a:stretch/>
+        </p:blipFill>
+        <p:spPr>
+          <a:xfrm>
+            <a:off x="373626" y="264592"/>
+            <a:ext cx="3220769" cy="4425801"/>
+          </a:xfrm>
+          <a:prstGeom prst="rect">
+            <a:avLst/>
+          </a:prstGeom>
+        </p:spPr>
+      </p:pic>
+      <p:pic>
+        <p:nvPicPr>
+          <p:cNvPr id="7" name="Picture 6">
+            <a:extLst>
+              <a:ext uri="{FF2B5EF4-FFF2-40B4-BE49-F238E27FC236}">
+                <a16:creationId xmlns:a16="http://schemas.microsoft.com/office/drawing/2014/main" id="{5B3620F9-5EBC-433C-87A7-517DAD2E9ADF}"/>
+              </a:ext>
+            </a:extLst>
+          </p:cNvPr>
+          <p:cNvPicPr>
+            <a:picLocks noChangeAspect="1"/>
+          </p:cNvPicPr>
+          <p:nvPr/>
+        </p:nvPicPr>
+        <p:blipFill rotWithShape="1">
+          <a:blip r:embed="rId4"/>
+          <a:srcRect l="11915" r="11761"/>
+          <a:stretch/>
+        </p:blipFill>
+        <p:spPr>
+          <a:xfrm>
+            <a:off x="3618719" y="301207"/>
+            <a:ext cx="3627058" cy="4425801"/>
           </a:xfrm>
           <a:prstGeom prst="rect">
             <a:avLst/>
@@ -4540,8 +5120,66 @@
         </p:blipFill>
         <p:spPr>
           <a:xfrm>
-            <a:off x="5889523" y="0"/>
+            <a:off x="6999310" y="0"/>
             <a:ext cx="5064870" cy="6858000"/>
+          </a:xfrm>
+          <a:prstGeom prst="rect">
+            <a:avLst/>
+          </a:prstGeom>
+        </p:spPr>
+      </p:pic>
+      <p:pic>
+        <p:nvPicPr>
+          <p:cNvPr id="5" name="Picture 4">
+            <a:extLst>
+              <a:ext uri="{FF2B5EF4-FFF2-40B4-BE49-F238E27FC236}">
+                <a16:creationId xmlns:a16="http://schemas.microsoft.com/office/drawing/2014/main" id="{61B92753-3504-497A-A722-05754C51853F}"/>
+              </a:ext>
+            </a:extLst>
+          </p:cNvPr>
+          <p:cNvPicPr>
+            <a:picLocks noChangeAspect="1"/>
+          </p:cNvPicPr>
+          <p:nvPr/>
+        </p:nvPicPr>
+        <p:blipFill rotWithShape="1">
+          <a:blip r:embed="rId3"/>
+          <a:srcRect l="14248" r="18289"/>
+          <a:stretch/>
+        </p:blipFill>
+        <p:spPr>
+          <a:xfrm>
+            <a:off x="127820" y="442452"/>
+            <a:ext cx="3028335" cy="4180546"/>
+          </a:xfrm>
+          <a:prstGeom prst="rect">
+            <a:avLst/>
+          </a:prstGeom>
+        </p:spPr>
+      </p:pic>
+      <p:pic>
+        <p:nvPicPr>
+          <p:cNvPr id="7" name="Picture 6">
+            <a:extLst>
+              <a:ext uri="{FF2B5EF4-FFF2-40B4-BE49-F238E27FC236}">
+                <a16:creationId xmlns:a16="http://schemas.microsoft.com/office/drawing/2014/main" id="{F6D29035-832E-4639-91A0-6DDE6C23C65A}"/>
+              </a:ext>
+            </a:extLst>
+          </p:cNvPr>
+          <p:cNvPicPr>
+            <a:picLocks noChangeAspect="1"/>
+          </p:cNvPicPr>
+          <p:nvPr/>
+        </p:nvPicPr>
+        <p:blipFill rotWithShape="1">
+          <a:blip r:embed="rId4"/>
+          <a:srcRect l="11138" r="9895"/>
+          <a:stretch/>
+        </p:blipFill>
+        <p:spPr>
+          <a:xfrm>
+            <a:off x="3329478" y="445571"/>
+            <a:ext cx="3726426" cy="4394885"/>
           </a:xfrm>
           <a:prstGeom prst="rect">
             <a:avLst/>
@@ -4702,8 +5340,66 @@
         </p:blipFill>
         <p:spPr>
           <a:xfrm>
-            <a:off x="5884119" y="0"/>
+            <a:off x="6896727" y="1"/>
             <a:ext cx="5569169" cy="6857999"/>
+          </a:xfrm>
+          <a:prstGeom prst="rect">
+            <a:avLst/>
+          </a:prstGeom>
+        </p:spPr>
+      </p:pic>
+      <p:pic>
+        <p:nvPicPr>
+          <p:cNvPr id="5" name="Picture 4">
+            <a:extLst>
+              <a:ext uri="{FF2B5EF4-FFF2-40B4-BE49-F238E27FC236}">
+                <a16:creationId xmlns:a16="http://schemas.microsoft.com/office/drawing/2014/main" id="{8B24069D-2604-4408-B802-DC44543D6F93}"/>
+              </a:ext>
+            </a:extLst>
+          </p:cNvPr>
+          <p:cNvPicPr>
+            <a:picLocks noChangeAspect="1"/>
+          </p:cNvPicPr>
+          <p:nvPr/>
+        </p:nvPicPr>
+        <p:blipFill rotWithShape="1">
+          <a:blip r:embed="rId3"/>
+          <a:srcRect l="10982" r="15024"/>
+          <a:stretch/>
+        </p:blipFill>
+        <p:spPr>
+          <a:xfrm>
+            <a:off x="1856" y="135143"/>
+            <a:ext cx="3545568" cy="4462700"/>
+          </a:xfrm>
+          <a:prstGeom prst="rect">
+            <a:avLst/>
+          </a:prstGeom>
+        </p:spPr>
+      </p:pic>
+      <p:pic>
+        <p:nvPicPr>
+          <p:cNvPr id="7" name="Picture 6">
+            <a:extLst>
+              <a:ext uri="{FF2B5EF4-FFF2-40B4-BE49-F238E27FC236}">
+                <a16:creationId xmlns:a16="http://schemas.microsoft.com/office/drawing/2014/main" id="{D89AB6B5-659C-4279-AA64-CAF906D4D789}"/>
+              </a:ext>
+            </a:extLst>
+          </p:cNvPr>
+          <p:cNvPicPr>
+            <a:picLocks noChangeAspect="1"/>
+          </p:cNvPicPr>
+          <p:nvPr/>
+        </p:nvPicPr>
+        <p:blipFill rotWithShape="1">
+          <a:blip r:embed="rId4"/>
+          <a:srcRect l="6721" r="5231"/>
+          <a:stretch/>
+        </p:blipFill>
+        <p:spPr>
+          <a:xfrm>
+            <a:off x="3511113" y="460297"/>
+            <a:ext cx="3889616" cy="4114228"/>
           </a:xfrm>
           <a:prstGeom prst="rect">
             <a:avLst/>
@@ -4795,8 +5491,66 @@
         </p:blipFill>
         <p:spPr>
           <a:xfrm>
-            <a:off x="5643715" y="0"/>
+            <a:off x="6806761" y="0"/>
             <a:ext cx="5385239" cy="6858000"/>
+          </a:xfrm>
+          <a:prstGeom prst="rect">
+            <a:avLst/>
+          </a:prstGeom>
+        </p:spPr>
+      </p:pic>
+      <p:pic>
+        <p:nvPicPr>
+          <p:cNvPr id="5" name="Picture 4">
+            <a:extLst>
+              <a:ext uri="{FF2B5EF4-FFF2-40B4-BE49-F238E27FC236}">
+                <a16:creationId xmlns:a16="http://schemas.microsoft.com/office/drawing/2014/main" id="{32A72389-4845-468B-80D0-65B12646AB94}"/>
+              </a:ext>
+            </a:extLst>
+          </p:cNvPr>
+          <p:cNvPicPr>
+            <a:picLocks noChangeAspect="1"/>
+          </p:cNvPicPr>
+          <p:nvPr/>
+        </p:nvPicPr>
+        <p:blipFill rotWithShape="1">
+          <a:blip r:embed="rId3"/>
+          <a:srcRect l="13315" r="14860"/>
+          <a:stretch/>
+        </p:blipFill>
+        <p:spPr>
+          <a:xfrm>
+            <a:off x="481781" y="277137"/>
+            <a:ext cx="3160264" cy="4097748"/>
+          </a:xfrm>
+          <a:prstGeom prst="rect">
+            <a:avLst/>
+          </a:prstGeom>
+        </p:spPr>
+      </p:pic>
+      <p:pic>
+        <p:nvPicPr>
+          <p:cNvPr id="7" name="Picture 6">
+            <a:extLst>
+              <a:ext uri="{FF2B5EF4-FFF2-40B4-BE49-F238E27FC236}">
+                <a16:creationId xmlns:a16="http://schemas.microsoft.com/office/drawing/2014/main" id="{4AD49045-84FF-4236-B78B-F265E82B190A}"/>
+              </a:ext>
+            </a:extLst>
+          </p:cNvPr>
+          <p:cNvPicPr>
+            <a:picLocks noChangeAspect="1"/>
+          </p:cNvPicPr>
+          <p:nvPr/>
+        </p:nvPicPr>
+        <p:blipFill rotWithShape="1">
+          <a:blip r:embed="rId4"/>
+          <a:srcRect l="6209" r="8651"/>
+          <a:stretch/>
+        </p:blipFill>
+        <p:spPr>
+          <a:xfrm>
+            <a:off x="3642045" y="414319"/>
+            <a:ext cx="3620680" cy="3960566"/>
           </a:xfrm>
           <a:prstGeom prst="rect">
             <a:avLst/>
@@ -4882,8 +5636,66 @@
         </p:blipFill>
         <p:spPr>
           <a:xfrm>
-            <a:off x="6095999" y="0"/>
+            <a:off x="6697649" y="0"/>
             <a:ext cx="5494351" cy="6858000"/>
+          </a:xfrm>
+          <a:prstGeom prst="rect">
+            <a:avLst/>
+          </a:prstGeom>
+        </p:spPr>
+      </p:pic>
+      <p:pic>
+        <p:nvPicPr>
+          <p:cNvPr id="5" name="Picture 4">
+            <a:extLst>
+              <a:ext uri="{FF2B5EF4-FFF2-40B4-BE49-F238E27FC236}">
+                <a16:creationId xmlns:a16="http://schemas.microsoft.com/office/drawing/2014/main" id="{B2599A08-F0A9-49F0-8C66-CE377EC67159}"/>
+              </a:ext>
+            </a:extLst>
+          </p:cNvPr>
+          <p:cNvPicPr>
+            <a:picLocks noChangeAspect="1"/>
+          </p:cNvPicPr>
+          <p:nvPr/>
+        </p:nvPicPr>
+        <p:blipFill rotWithShape="1">
+          <a:blip r:embed="rId3"/>
+          <a:srcRect l="26838" r="23729"/>
+          <a:stretch/>
+        </p:blipFill>
+        <p:spPr>
+          <a:xfrm>
+            <a:off x="530942" y="396617"/>
+            <a:ext cx="3126658" cy="4099915"/>
+          </a:xfrm>
+          <a:prstGeom prst="rect">
+            <a:avLst/>
+          </a:prstGeom>
+        </p:spPr>
+      </p:pic>
+      <p:pic>
+        <p:nvPicPr>
+          <p:cNvPr id="7" name="Picture 6">
+            <a:extLst>
+              <a:ext uri="{FF2B5EF4-FFF2-40B4-BE49-F238E27FC236}">
+                <a16:creationId xmlns:a16="http://schemas.microsoft.com/office/drawing/2014/main" id="{6740403F-920B-4FC1-90AB-1D3B22382735}"/>
+              </a:ext>
+            </a:extLst>
+          </p:cNvPr>
+          <p:cNvPicPr>
+            <a:picLocks noChangeAspect="1"/>
+          </p:cNvPicPr>
+          <p:nvPr/>
+        </p:nvPicPr>
+        <p:blipFill rotWithShape="1">
+          <a:blip r:embed="rId4"/>
+          <a:srcRect l="19999" r="19844"/>
+          <a:stretch/>
+        </p:blipFill>
+        <p:spPr>
+          <a:xfrm>
+            <a:off x="3156154" y="396616"/>
+            <a:ext cx="3805084" cy="4099915"/>
           </a:xfrm>
           <a:prstGeom prst="rect">
             <a:avLst/>
@@ -5058,6 +5870,64 @@
           </a:prstGeom>
         </p:spPr>
       </p:pic>
+      <p:pic>
+        <p:nvPicPr>
+          <p:cNvPr id="4" name="Picture 3">
+            <a:extLst>
+              <a:ext uri="{FF2B5EF4-FFF2-40B4-BE49-F238E27FC236}">
+                <a16:creationId xmlns:a16="http://schemas.microsoft.com/office/drawing/2014/main" id="{8B83EDFF-8C05-468F-9FF0-5A333927CD8F}"/>
+              </a:ext>
+            </a:extLst>
+          </p:cNvPr>
+          <p:cNvPicPr>
+            <a:picLocks noChangeAspect="1"/>
+          </p:cNvPicPr>
+          <p:nvPr/>
+        </p:nvPicPr>
+        <p:blipFill rotWithShape="1">
+          <a:blip r:embed="rId3"/>
+          <a:srcRect l="15647" r="14713"/>
+          <a:stretch/>
+        </p:blipFill>
+        <p:spPr>
+          <a:xfrm>
+            <a:off x="521110" y="611434"/>
+            <a:ext cx="2711560" cy="3626269"/>
+          </a:xfrm>
+          <a:prstGeom prst="rect">
+            <a:avLst/>
+          </a:prstGeom>
+        </p:spPr>
+      </p:pic>
+      <p:pic>
+        <p:nvPicPr>
+          <p:cNvPr id="7" name="Picture 6">
+            <a:extLst>
+              <a:ext uri="{FF2B5EF4-FFF2-40B4-BE49-F238E27FC236}">
+                <a16:creationId xmlns:a16="http://schemas.microsoft.com/office/drawing/2014/main" id="{80EAF87B-6DDA-4DE3-A9C9-27409A9918DF}"/>
+              </a:ext>
+            </a:extLst>
+          </p:cNvPr>
+          <p:cNvPicPr>
+            <a:picLocks noChangeAspect="1"/>
+          </p:cNvPicPr>
+          <p:nvPr/>
+        </p:nvPicPr>
+        <p:blipFill rotWithShape="1">
+          <a:blip r:embed="rId4"/>
+          <a:srcRect l="9895" r="8341"/>
+          <a:stretch/>
+        </p:blipFill>
+        <p:spPr>
+          <a:xfrm>
+            <a:off x="3447139" y="611434"/>
+            <a:ext cx="3718857" cy="4235869"/>
+          </a:xfrm>
+          <a:prstGeom prst="rect">
+            <a:avLst/>
+          </a:prstGeom>
+        </p:spPr>
+      </p:pic>
     </p:spTree>
     <p:extLst>
       <p:ext uri="{BB962C8B-B14F-4D97-AF65-F5344CB8AC3E}">
@@ -5225,6 +6095,64 @@
           <a:xfrm>
             <a:off x="7110603" y="0"/>
             <a:ext cx="5078349" cy="6890521"/>
+          </a:xfrm>
+          <a:prstGeom prst="rect">
+            <a:avLst/>
+          </a:prstGeom>
+        </p:spPr>
+      </p:pic>
+      <p:pic>
+        <p:nvPicPr>
+          <p:cNvPr id="5" name="Picture 4">
+            <a:extLst>
+              <a:ext uri="{FF2B5EF4-FFF2-40B4-BE49-F238E27FC236}">
+                <a16:creationId xmlns:a16="http://schemas.microsoft.com/office/drawing/2014/main" id="{D9BBDF97-EE0B-4A32-B92B-B997D999F44B}"/>
+              </a:ext>
+            </a:extLst>
+          </p:cNvPr>
+          <p:cNvPicPr>
+            <a:picLocks noChangeAspect="1"/>
+          </p:cNvPicPr>
+          <p:nvPr/>
+        </p:nvPicPr>
+        <p:blipFill rotWithShape="1">
+          <a:blip r:embed="rId3"/>
+          <a:srcRect l="13626" r="13314"/>
+          <a:stretch/>
+        </p:blipFill>
+        <p:spPr>
+          <a:xfrm>
+            <a:off x="180337" y="202901"/>
+            <a:ext cx="3338359" cy="4255533"/>
+          </a:xfrm>
+          <a:prstGeom prst="rect">
+            <a:avLst/>
+          </a:prstGeom>
+        </p:spPr>
+      </p:pic>
+      <p:pic>
+        <p:nvPicPr>
+          <p:cNvPr id="7" name="Picture 6">
+            <a:extLst>
+              <a:ext uri="{FF2B5EF4-FFF2-40B4-BE49-F238E27FC236}">
+                <a16:creationId xmlns:a16="http://schemas.microsoft.com/office/drawing/2014/main" id="{FAC55039-5D61-4480-8B0E-55F080D7946E}"/>
+              </a:ext>
+            </a:extLst>
+          </p:cNvPr>
+          <p:cNvPicPr>
+            <a:picLocks noChangeAspect="1"/>
+          </p:cNvPicPr>
+          <p:nvPr/>
+        </p:nvPicPr>
+        <p:blipFill rotWithShape="1">
+          <a:blip r:embed="rId4"/>
+          <a:srcRect l="7873" r="6786"/>
+          <a:stretch/>
+        </p:blipFill>
+        <p:spPr>
+          <a:xfrm>
+            <a:off x="3431458" y="483615"/>
+            <a:ext cx="3971564" cy="4334191"/>
           </a:xfrm>
           <a:prstGeom prst="rect">
             <a:avLst/>
@@ -5396,8 +6324,66 @@
         </p:blipFill>
         <p:spPr>
           <a:xfrm>
-            <a:off x="6317671" y="0"/>
+            <a:off x="7236140" y="-35960"/>
             <a:ext cx="4952812" cy="6858000"/>
+          </a:xfrm>
+          <a:prstGeom prst="rect">
+            <a:avLst/>
+          </a:prstGeom>
+        </p:spPr>
+      </p:pic>
+      <p:pic>
+        <p:nvPicPr>
+          <p:cNvPr id="4" name="Picture 3">
+            <a:extLst>
+              <a:ext uri="{FF2B5EF4-FFF2-40B4-BE49-F238E27FC236}">
+                <a16:creationId xmlns:a16="http://schemas.microsoft.com/office/drawing/2014/main" id="{335C0785-D7DF-474D-89A6-65CFE1F9D655}"/>
+              </a:ext>
+            </a:extLst>
+          </p:cNvPr>
+          <p:cNvPicPr>
+            <a:picLocks noChangeAspect="1"/>
+          </p:cNvPicPr>
+          <p:nvPr/>
+        </p:nvPicPr>
+        <p:blipFill rotWithShape="1">
+          <a:blip r:embed="rId3"/>
+          <a:srcRect l="16890" r="15957"/>
+          <a:stretch/>
+        </p:blipFill>
+        <p:spPr>
+          <a:xfrm>
+            <a:off x="324464" y="306634"/>
+            <a:ext cx="2979175" cy="4131722"/>
+          </a:xfrm>
+          <a:prstGeom prst="rect">
+            <a:avLst/>
+          </a:prstGeom>
+        </p:spPr>
+      </p:pic>
+      <p:pic>
+        <p:nvPicPr>
+          <p:cNvPr id="7" name="Picture 6">
+            <a:extLst>
+              <a:ext uri="{FF2B5EF4-FFF2-40B4-BE49-F238E27FC236}">
+                <a16:creationId xmlns:a16="http://schemas.microsoft.com/office/drawing/2014/main" id="{275CFBBA-0C89-4CA1-9D87-417CE4121EB7}"/>
+              </a:ext>
+            </a:extLst>
+          </p:cNvPr>
+          <p:cNvPicPr>
+            <a:picLocks noChangeAspect="1"/>
+          </p:cNvPicPr>
+          <p:nvPr/>
+        </p:nvPicPr>
+        <p:blipFill rotWithShape="1">
+          <a:blip r:embed="rId4"/>
+          <a:srcRect l="8985" r="12071"/>
+          <a:stretch/>
+        </p:blipFill>
+        <p:spPr>
+          <a:xfrm>
+            <a:off x="3501761" y="483615"/>
+            <a:ext cx="3682212" cy="4344024"/>
           </a:xfrm>
           <a:prstGeom prst="rect">
             <a:avLst/>
@@ -5569,8 +6555,66 @@
         </p:blipFill>
         <p:spPr>
           <a:xfrm>
-            <a:off x="6094476" y="0"/>
+            <a:off x="7236143" y="0"/>
             <a:ext cx="4952809" cy="6858000"/>
+          </a:xfrm>
+          <a:prstGeom prst="rect">
+            <a:avLst/>
+          </a:prstGeom>
+        </p:spPr>
+      </p:pic>
+      <p:pic>
+        <p:nvPicPr>
+          <p:cNvPr id="5" name="Picture 4">
+            <a:extLst>
+              <a:ext uri="{FF2B5EF4-FFF2-40B4-BE49-F238E27FC236}">
+                <a16:creationId xmlns:a16="http://schemas.microsoft.com/office/drawing/2014/main" id="{991AA358-8D7F-4CE5-8B8B-76B9C9987D93}"/>
+              </a:ext>
+            </a:extLst>
+          </p:cNvPr>
+          <p:cNvPicPr>
+            <a:picLocks noChangeAspect="1"/>
+          </p:cNvPicPr>
+          <p:nvPr/>
+        </p:nvPicPr>
+        <p:blipFill rotWithShape="1">
+          <a:blip r:embed="rId3"/>
+          <a:srcRect l="14248" r="15179"/>
+          <a:stretch/>
+        </p:blipFill>
+        <p:spPr>
+          <a:xfrm>
+            <a:off x="430612" y="446992"/>
+            <a:ext cx="3187460" cy="4206372"/>
+          </a:xfrm>
+          <a:prstGeom prst="rect">
+            <a:avLst/>
+          </a:prstGeom>
+        </p:spPr>
+      </p:pic>
+      <p:pic>
+        <p:nvPicPr>
+          <p:cNvPr id="7" name="Picture 6">
+            <a:extLst>
+              <a:ext uri="{FF2B5EF4-FFF2-40B4-BE49-F238E27FC236}">
+                <a16:creationId xmlns:a16="http://schemas.microsoft.com/office/drawing/2014/main" id="{4C6AC424-9296-4531-887C-89118C4455A4}"/>
+              </a:ext>
+            </a:extLst>
+          </p:cNvPr>
+          <p:cNvPicPr>
+            <a:picLocks noChangeAspect="1"/>
+          </p:cNvPicPr>
+          <p:nvPr/>
+        </p:nvPicPr>
+        <p:blipFill rotWithShape="1">
+          <a:blip r:embed="rId4"/>
+          <a:srcRect l="10824" r="10824"/>
+          <a:stretch/>
+        </p:blipFill>
+        <p:spPr>
+          <a:xfrm>
+            <a:off x="3981468" y="483615"/>
+            <a:ext cx="3754434" cy="4462700"/>
           </a:xfrm>
           <a:prstGeom prst="rect">
             <a:avLst/>
@@ -5742,8 +6786,66 @@
         </p:blipFill>
         <p:spPr>
           <a:xfrm>
-            <a:off x="5614220" y="0"/>
+            <a:off x="7059709" y="11387"/>
             <a:ext cx="5614072" cy="6858000"/>
+          </a:xfrm>
+          <a:prstGeom prst="rect">
+            <a:avLst/>
+          </a:prstGeom>
+        </p:spPr>
+      </p:pic>
+      <p:pic>
+        <p:nvPicPr>
+          <p:cNvPr id="5" name="Picture 4">
+            <a:extLst>
+              <a:ext uri="{FF2B5EF4-FFF2-40B4-BE49-F238E27FC236}">
+                <a16:creationId xmlns:a16="http://schemas.microsoft.com/office/drawing/2014/main" id="{ECED3311-6103-4D9F-B522-9E7AC682C516}"/>
+              </a:ext>
+            </a:extLst>
+          </p:cNvPr>
+          <p:cNvPicPr>
+            <a:picLocks noChangeAspect="1"/>
+          </p:cNvPicPr>
+          <p:nvPr/>
+        </p:nvPicPr>
+        <p:blipFill rotWithShape="1">
+          <a:blip r:embed="rId3"/>
+          <a:srcRect l="14248" r="11242"/>
+          <a:stretch/>
+        </p:blipFill>
+        <p:spPr>
+          <a:xfrm>
+            <a:off x="78658" y="11387"/>
+            <a:ext cx="3834582" cy="4792921"/>
+          </a:xfrm>
+          <a:prstGeom prst="rect">
+            <a:avLst/>
+          </a:prstGeom>
+        </p:spPr>
+      </p:pic>
+      <p:pic>
+        <p:nvPicPr>
+          <p:cNvPr id="7" name="Picture 6">
+            <a:extLst>
+              <a:ext uri="{FF2B5EF4-FFF2-40B4-BE49-F238E27FC236}">
+                <a16:creationId xmlns:a16="http://schemas.microsoft.com/office/drawing/2014/main" id="{FC585BD7-9F16-46A2-A825-78FD3CE9D21F}"/>
+              </a:ext>
+            </a:extLst>
+          </p:cNvPr>
+          <p:cNvPicPr>
+            <a:picLocks noChangeAspect="1"/>
+          </p:cNvPicPr>
+          <p:nvPr/>
+        </p:nvPicPr>
+        <p:blipFill rotWithShape="1">
+          <a:blip r:embed="rId4"/>
+          <a:srcRect l="8340" r="7874"/>
+          <a:stretch/>
+        </p:blipFill>
+        <p:spPr>
+          <a:xfrm>
+            <a:off x="3392911" y="184518"/>
+            <a:ext cx="4187128" cy="4654214"/>
           </a:xfrm>
           <a:prstGeom prst="rect">
             <a:avLst/>
@@ -5915,8 +7017,66 @@
         </p:blipFill>
         <p:spPr>
           <a:xfrm>
-            <a:off x="6683434" y="0"/>
+            <a:off x="7468306" y="0"/>
             <a:ext cx="4720646" cy="6858000"/>
+          </a:xfrm>
+          <a:prstGeom prst="rect">
+            <a:avLst/>
+          </a:prstGeom>
+        </p:spPr>
+      </p:pic>
+      <p:pic>
+        <p:nvPicPr>
+          <p:cNvPr id="5" name="Picture 4">
+            <a:extLst>
+              <a:ext uri="{FF2B5EF4-FFF2-40B4-BE49-F238E27FC236}">
+                <a16:creationId xmlns:a16="http://schemas.microsoft.com/office/drawing/2014/main" id="{BC28C9FB-F8E1-4AB6-A2A4-67BCE805A86C}"/>
+              </a:ext>
+            </a:extLst>
+          </p:cNvPr>
+          <p:cNvPicPr>
+            <a:picLocks noChangeAspect="1"/>
+          </p:cNvPicPr>
+          <p:nvPr/>
+        </p:nvPicPr>
+        <p:blipFill rotWithShape="1">
+          <a:blip r:embed="rId3"/>
+          <a:srcRect l="14558" r="15957"/>
+          <a:stretch/>
+        </p:blipFill>
+        <p:spPr>
+          <a:xfrm>
+            <a:off x="280456" y="326298"/>
+            <a:ext cx="3160322" cy="4235869"/>
+          </a:xfrm>
+          <a:prstGeom prst="rect">
+            <a:avLst/>
+          </a:prstGeom>
+        </p:spPr>
+      </p:pic>
+      <p:pic>
+        <p:nvPicPr>
+          <p:cNvPr id="7" name="Picture 6">
+            <a:extLst>
+              <a:ext uri="{FF2B5EF4-FFF2-40B4-BE49-F238E27FC236}">
+                <a16:creationId xmlns:a16="http://schemas.microsoft.com/office/drawing/2014/main" id="{29D95EF4-4E60-46F2-BC17-D55AFBA34FC3}"/>
+              </a:ext>
+            </a:extLst>
+          </p:cNvPr>
+          <p:cNvPicPr>
+            <a:picLocks noChangeAspect="1"/>
+          </p:cNvPicPr>
+          <p:nvPr/>
+        </p:nvPicPr>
+        <p:blipFill rotWithShape="1">
+          <a:blip r:embed="rId4"/>
+          <a:srcRect l="9894" r="10051"/>
+          <a:stretch/>
+        </p:blipFill>
+        <p:spPr>
+          <a:xfrm>
+            <a:off x="3559276" y="483615"/>
+            <a:ext cx="4010477" cy="4665601"/>
           </a:xfrm>
           <a:prstGeom prst="rect">
             <a:avLst/>

</xml_diff>